<commit_message>
Updates following 'private map' analysis
Maps should be an object therefore data model has been updated and a new
mapping filter page has been added to the wireframes. I have also
started a use case examples excel sheet for recording all examples use
cases
</commit_message>
<xml_diff>
--- a/ba/Project GG Analysis.pptx
+++ b/ba/Project GG Analysis.pptx
@@ -318,11 +318,11 @@
           <a:lstStyle/>
           <a:p>
             <a:fld id="{B61BEF0D-F0BB-DE4B-95CE-6DB70DBA9567}" type="datetimeFigureOut">
-              <a:rPr lang="en-US" dirty="0"/>
+              <a:rPr lang="en-US"/>
               <a:pPr/>
-              <a:t>12/26/2016</a:t>
+              <a:t>1/4/2017</a:t>
             </a:fld>
-            <a:endParaRPr lang="en-US" dirty="0"/>
+            <a:endParaRPr lang="en-US"/>
           </a:p>
         </p:txBody>
       </p:sp>
@@ -341,7 +341,7 @@
           <a:bodyPr/>
           <a:lstStyle/>
           <a:p>
-            <a:endParaRPr lang="en-US" dirty="0"/>
+            <a:endParaRPr lang="en-US"/>
           </a:p>
         </p:txBody>
       </p:sp>
@@ -665,11 +665,11 @@
           <a:lstStyle/>
           <a:p>
             <a:fld id="{B61BEF0D-F0BB-DE4B-95CE-6DB70DBA9567}" type="datetimeFigureOut">
-              <a:rPr lang="en-US" dirty="0"/>
+              <a:rPr lang="en-US"/>
               <a:pPr/>
-              <a:t>12/26/2016</a:t>
+              <a:t>1/4/2017</a:t>
             </a:fld>
-            <a:endParaRPr lang="en-US" dirty="0"/>
+            <a:endParaRPr lang="en-US"/>
           </a:p>
         </p:txBody>
       </p:sp>
@@ -688,7 +688,7 @@
           <a:bodyPr/>
           <a:lstStyle/>
           <a:p>
-            <a:endParaRPr lang="en-US" dirty="0"/>
+            <a:endParaRPr lang="en-US"/>
           </a:p>
         </p:txBody>
       </p:sp>
@@ -795,11 +795,11 @@
           <a:lstStyle/>
           <a:p>
             <a:fld id="{D57F1E4F-1CFF-5643-939E-217C01CDF565}" type="slidenum">
-              <a:rPr lang="en-US" dirty="0"/>
+              <a:rPr lang="en-US"/>
               <a:pPr/>
               <a:t>‹#›</a:t>
             </a:fld>
-            <a:endParaRPr lang="en-US" dirty="0"/>
+            <a:endParaRPr lang="en-US"/>
           </a:p>
         </p:txBody>
       </p:sp>
@@ -1063,11 +1063,11 @@
           <a:lstStyle/>
           <a:p>
             <a:fld id="{B61BEF0D-F0BB-DE4B-95CE-6DB70DBA9567}" type="datetimeFigureOut">
-              <a:rPr lang="en-US" dirty="0"/>
+              <a:rPr lang="en-US"/>
               <a:pPr/>
-              <a:t>12/26/2016</a:t>
+              <a:t>1/4/2017</a:t>
             </a:fld>
-            <a:endParaRPr lang="en-US" dirty="0"/>
+            <a:endParaRPr lang="en-US"/>
           </a:p>
         </p:txBody>
       </p:sp>
@@ -1086,7 +1086,7 @@
           <a:bodyPr/>
           <a:lstStyle/>
           <a:p>
-            <a:endParaRPr lang="en-US" dirty="0"/>
+            <a:endParaRPr lang="en-US"/>
           </a:p>
         </p:txBody>
       </p:sp>
@@ -1193,11 +1193,11 @@
           <a:lstStyle/>
           <a:p>
             <a:fld id="{D57F1E4F-1CFF-5643-939E-217C01CDF565}" type="slidenum">
-              <a:rPr lang="en-US" dirty="0"/>
+              <a:rPr lang="en-US"/>
               <a:pPr/>
               <a:t>‹#›</a:t>
             </a:fld>
-            <a:endParaRPr lang="en-US" dirty="0"/>
+            <a:endParaRPr lang="en-US"/>
           </a:p>
         </p:txBody>
       </p:sp>
@@ -1224,7 +1224,7 @@
           <a:p>
             <a:pPr lvl="0"/>
             <a:r>
-              <a:rPr lang="en-US" sz="8000" baseline="0" dirty="0">
+              <a:rPr lang="en-US" sz="8000" baseline="0">
                 <a:ln w="3175" cmpd="sng">
                   <a:noFill/>
                 </a:ln>
@@ -1262,7 +1262,7 @@
           <a:p>
             <a:pPr lvl="0"/>
             <a:r>
-              <a:rPr lang="en-US" sz="8000" baseline="0" dirty="0">
+              <a:rPr lang="en-US" sz="8000" baseline="0">
                 <a:ln w="3175" cmpd="sng">
                   <a:noFill/>
                 </a:ln>
@@ -1396,11 +1396,11 @@
           <a:lstStyle/>
           <a:p>
             <a:fld id="{B61BEF0D-F0BB-DE4B-95CE-6DB70DBA9567}" type="datetimeFigureOut">
-              <a:rPr lang="en-US" dirty="0"/>
+              <a:rPr lang="en-US"/>
               <a:pPr/>
-              <a:t>12/26/2016</a:t>
+              <a:t>1/4/2017</a:t>
             </a:fld>
-            <a:endParaRPr lang="en-US" dirty="0"/>
+            <a:endParaRPr lang="en-US"/>
           </a:p>
         </p:txBody>
       </p:sp>
@@ -1419,7 +1419,7 @@
           <a:bodyPr/>
           <a:lstStyle/>
           <a:p>
-            <a:endParaRPr lang="en-US" dirty="0"/>
+            <a:endParaRPr lang="en-US"/>
           </a:p>
         </p:txBody>
       </p:sp>
@@ -1526,11 +1526,11 @@
           <a:lstStyle/>
           <a:p>
             <a:fld id="{D57F1E4F-1CFF-5643-939E-217C01CDF565}" type="slidenum">
-              <a:rPr lang="en-US" dirty="0"/>
+              <a:rPr lang="en-US"/>
               <a:pPr/>
               <a:t>‹#›</a:t>
             </a:fld>
-            <a:endParaRPr lang="en-US" dirty="0"/>
+            <a:endParaRPr lang="en-US"/>
           </a:p>
         </p:txBody>
       </p:sp>
@@ -1713,11 +1713,11 @@
           <a:lstStyle/>
           <a:p>
             <a:fld id="{B61BEF0D-F0BB-DE4B-95CE-6DB70DBA9567}" type="datetimeFigureOut">
-              <a:rPr lang="en-US" dirty="0"/>
+              <a:rPr lang="en-US"/>
               <a:pPr/>
-              <a:t>12/26/2016</a:t>
+              <a:t>1/4/2017</a:t>
             </a:fld>
-            <a:endParaRPr lang="en-US" dirty="0"/>
+            <a:endParaRPr lang="en-US"/>
           </a:p>
         </p:txBody>
       </p:sp>
@@ -1736,7 +1736,7 @@
           <a:bodyPr/>
           <a:lstStyle/>
           <a:p>
-            <a:endParaRPr lang="en-US" dirty="0"/>
+            <a:endParaRPr lang="en-US"/>
           </a:p>
         </p:txBody>
       </p:sp>
@@ -1843,11 +1843,11 @@
           <a:lstStyle/>
           <a:p>
             <a:fld id="{D57F1E4F-1CFF-5643-939E-217C01CDF565}" type="slidenum">
-              <a:rPr lang="en-US" dirty="0"/>
+              <a:rPr lang="en-US"/>
               <a:pPr/>
               <a:t>‹#›</a:t>
             </a:fld>
-            <a:endParaRPr lang="en-US" dirty="0"/>
+            <a:endParaRPr lang="en-US"/>
           </a:p>
         </p:txBody>
       </p:sp>
@@ -1874,7 +1874,7 @@
           <a:p>
             <a:pPr lvl="0"/>
             <a:r>
-              <a:rPr lang="en-US" sz="8000" baseline="0" dirty="0">
+              <a:rPr lang="en-US" sz="8000" baseline="0">
                 <a:ln w="3175" cmpd="sng">
                   <a:noFill/>
                 </a:ln>
@@ -1912,7 +1912,7 @@
           <a:p>
             <a:pPr lvl="0"/>
             <a:r>
-              <a:rPr lang="en-US" sz="8000" baseline="0" dirty="0">
+              <a:rPr lang="en-US" sz="8000" baseline="0">
                 <a:ln w="3175" cmpd="sng">
                   <a:noFill/>
                 </a:ln>
@@ -2106,11 +2106,11 @@
           <a:lstStyle/>
           <a:p>
             <a:fld id="{B61BEF0D-F0BB-DE4B-95CE-6DB70DBA9567}" type="datetimeFigureOut">
-              <a:rPr lang="en-US" dirty="0"/>
+              <a:rPr lang="en-US"/>
               <a:pPr/>
-              <a:t>12/26/2016</a:t>
+              <a:t>1/4/2017</a:t>
             </a:fld>
-            <a:endParaRPr lang="en-US" dirty="0"/>
+            <a:endParaRPr lang="en-US"/>
           </a:p>
         </p:txBody>
       </p:sp>
@@ -2129,7 +2129,7 @@
           <a:bodyPr/>
           <a:lstStyle/>
           <a:p>
-            <a:endParaRPr lang="en-US" dirty="0"/>
+            <a:endParaRPr lang="en-US"/>
           </a:p>
         </p:txBody>
       </p:sp>
@@ -2236,11 +2236,11 @@
           <a:lstStyle/>
           <a:p>
             <a:fld id="{D57F1E4F-1CFF-5643-939E-217C01CDF565}" type="slidenum">
-              <a:rPr lang="en-US" dirty="0"/>
+              <a:rPr lang="en-US"/>
               <a:pPr/>
               <a:t>‹#›</a:t>
             </a:fld>
-            <a:endParaRPr lang="en-US" dirty="0"/>
+            <a:endParaRPr lang="en-US"/>
           </a:p>
         </p:txBody>
       </p:sp>
@@ -2360,11 +2360,11 @@
           <a:lstStyle/>
           <a:p>
             <a:fld id="{B61BEF0D-F0BB-DE4B-95CE-6DB70DBA9567}" type="datetimeFigureOut">
-              <a:rPr lang="en-US" dirty="0"/>
+              <a:rPr lang="en-US"/>
               <a:pPr/>
-              <a:t>12/26/2016</a:t>
+              <a:t>1/4/2017</a:t>
             </a:fld>
-            <a:endParaRPr lang="en-US" dirty="0"/>
+            <a:endParaRPr lang="en-US"/>
           </a:p>
         </p:txBody>
       </p:sp>
@@ -2383,7 +2383,7 @@
           <a:bodyPr/>
           <a:lstStyle/>
           <a:p>
-            <a:endParaRPr lang="en-US" dirty="0"/>
+            <a:endParaRPr lang="en-US"/>
           </a:p>
         </p:txBody>
       </p:sp>
@@ -2485,11 +2485,11 @@
           <a:lstStyle/>
           <a:p>
             <a:fld id="{D57F1E4F-1CFF-5643-939E-217C01CDF565}" type="slidenum">
-              <a:rPr lang="en-US" dirty="0"/>
+              <a:rPr lang="en-US"/>
               <a:pPr/>
               <a:t>‹#›</a:t>
             </a:fld>
-            <a:endParaRPr lang="en-US" dirty="0"/>
+            <a:endParaRPr lang="en-US"/>
           </a:p>
         </p:txBody>
       </p:sp>
@@ -2619,11 +2619,11 @@
           <a:lstStyle/>
           <a:p>
             <a:fld id="{B61BEF0D-F0BB-DE4B-95CE-6DB70DBA9567}" type="datetimeFigureOut">
-              <a:rPr lang="en-US" dirty="0"/>
+              <a:rPr lang="en-US"/>
               <a:pPr/>
-              <a:t>12/26/2016</a:t>
+              <a:t>1/4/2017</a:t>
             </a:fld>
-            <a:endParaRPr lang="en-US" dirty="0"/>
+            <a:endParaRPr lang="en-US"/>
           </a:p>
         </p:txBody>
       </p:sp>
@@ -2642,7 +2642,7 @@
           <a:bodyPr/>
           <a:lstStyle/>
           <a:p>
-            <a:endParaRPr lang="en-US" dirty="0"/>
+            <a:endParaRPr lang="en-US"/>
           </a:p>
         </p:txBody>
       </p:sp>
@@ -2744,11 +2744,11 @@
           <a:lstStyle/>
           <a:p>
             <a:fld id="{D57F1E4F-1CFF-5643-939E-217C01CDF565}" type="slidenum">
-              <a:rPr lang="en-US" dirty="0"/>
+              <a:rPr lang="en-US"/>
               <a:pPr/>
               <a:t>‹#›</a:t>
             </a:fld>
-            <a:endParaRPr lang="en-US" dirty="0"/>
+            <a:endParaRPr lang="en-US"/>
           </a:p>
         </p:txBody>
       </p:sp>
@@ -2878,11 +2878,11 @@
           <a:lstStyle/>
           <a:p>
             <a:fld id="{B61BEF0D-F0BB-DE4B-95CE-6DB70DBA9567}" type="datetimeFigureOut">
-              <a:rPr lang="en-US" dirty="0"/>
+              <a:rPr lang="en-US"/>
               <a:pPr/>
-              <a:t>12/26/2016</a:t>
+              <a:t>1/4/2017</a:t>
             </a:fld>
-            <a:endParaRPr lang="en-US" dirty="0"/>
+            <a:endParaRPr lang="en-US"/>
           </a:p>
         </p:txBody>
       </p:sp>
@@ -2901,7 +2901,7 @@
           <a:bodyPr/>
           <a:lstStyle/>
           <a:p>
-            <a:endParaRPr lang="en-US" dirty="0"/>
+            <a:endParaRPr lang="en-US"/>
           </a:p>
         </p:txBody>
       </p:sp>
@@ -3221,11 +3221,11 @@
           <a:lstStyle/>
           <a:p>
             <a:fld id="{B61BEF0D-F0BB-DE4B-95CE-6DB70DBA9567}" type="datetimeFigureOut">
-              <a:rPr lang="en-US" dirty="0"/>
+              <a:rPr lang="en-US"/>
               <a:pPr/>
-              <a:t>12/26/2016</a:t>
+              <a:t>1/4/2017</a:t>
             </a:fld>
-            <a:endParaRPr lang="en-US" dirty="0"/>
+            <a:endParaRPr lang="en-US"/>
           </a:p>
         </p:txBody>
       </p:sp>
@@ -3244,7 +3244,7 @@
           <a:bodyPr/>
           <a:lstStyle/>
           <a:p>
-            <a:endParaRPr lang="en-US" dirty="0"/>
+            <a:endParaRPr lang="en-US"/>
           </a:p>
         </p:txBody>
       </p:sp>
@@ -3351,11 +3351,11 @@
           <a:lstStyle/>
           <a:p>
             <a:fld id="{D57F1E4F-1CFF-5643-939E-217C01CDF565}" type="slidenum">
-              <a:rPr lang="en-US" dirty="0"/>
+              <a:rPr lang="en-US"/>
               <a:pPr/>
               <a:t>‹#›</a:t>
             </a:fld>
-            <a:endParaRPr lang="en-US" dirty="0"/>
+            <a:endParaRPr lang="en-US"/>
           </a:p>
         </p:txBody>
       </p:sp>
@@ -3541,11 +3541,11 @@
           <a:lstStyle/>
           <a:p>
             <a:fld id="{B61BEF0D-F0BB-DE4B-95CE-6DB70DBA9567}" type="datetimeFigureOut">
-              <a:rPr lang="en-US" dirty="0"/>
+              <a:rPr lang="en-US"/>
               <a:pPr/>
-              <a:t>12/26/2016</a:t>
+              <a:t>1/4/2017</a:t>
             </a:fld>
-            <a:endParaRPr lang="en-US" dirty="0"/>
+            <a:endParaRPr lang="en-US"/>
           </a:p>
         </p:txBody>
       </p:sp>
@@ -3564,7 +3564,7 @@
           <a:bodyPr/>
           <a:lstStyle/>
           <a:p>
-            <a:endParaRPr lang="en-US" dirty="0"/>
+            <a:endParaRPr lang="en-US"/>
           </a:p>
         </p:txBody>
       </p:sp>
@@ -3671,11 +3671,11 @@
           <a:lstStyle/>
           <a:p>
             <a:fld id="{D57F1E4F-1CFF-5643-939E-217C01CDF565}" type="slidenum">
-              <a:rPr lang="en-US" dirty="0"/>
+              <a:rPr lang="en-US"/>
               <a:pPr/>
               <a:t>‹#›</a:t>
             </a:fld>
-            <a:endParaRPr lang="en-US" dirty="0"/>
+            <a:endParaRPr lang="en-US"/>
           </a:p>
         </p:txBody>
       </p:sp>
@@ -3995,11 +3995,11 @@
           <a:lstStyle/>
           <a:p>
             <a:fld id="{B61BEF0D-F0BB-DE4B-95CE-6DB70DBA9567}" type="datetimeFigureOut">
-              <a:rPr lang="en-US" dirty="0"/>
+              <a:rPr lang="en-US"/>
               <a:pPr/>
-              <a:t>12/26/2016</a:t>
+              <a:t>1/4/2017</a:t>
             </a:fld>
-            <a:endParaRPr lang="en-US" dirty="0"/>
+            <a:endParaRPr lang="en-US"/>
           </a:p>
         </p:txBody>
       </p:sp>
@@ -4018,7 +4018,7 @@
           <a:bodyPr/>
           <a:lstStyle/>
           <a:p>
-            <a:endParaRPr lang="en-US" dirty="0"/>
+            <a:endParaRPr lang="en-US"/>
           </a:p>
         </p:txBody>
       </p:sp>
@@ -4125,11 +4125,11 @@
           <a:lstStyle/>
           <a:p>
             <a:fld id="{D57F1E4F-1CFF-5643-939E-217C01CDF565}" type="slidenum">
-              <a:rPr lang="en-US" dirty="0"/>
+              <a:rPr lang="en-US"/>
               <a:pPr/>
               <a:t>‹#›</a:t>
             </a:fld>
-            <a:endParaRPr lang="en-US" dirty="0"/>
+            <a:endParaRPr lang="en-US"/>
           </a:p>
         </p:txBody>
       </p:sp>
@@ -4197,11 +4197,11 @@
           <a:lstStyle/>
           <a:p>
             <a:fld id="{B61BEF0D-F0BB-DE4B-95CE-6DB70DBA9567}" type="datetimeFigureOut">
-              <a:rPr lang="en-US" dirty="0"/>
+              <a:rPr lang="en-US"/>
               <a:pPr/>
-              <a:t>12/26/2016</a:t>
+              <a:t>1/4/2017</a:t>
             </a:fld>
-            <a:endParaRPr lang="en-US" dirty="0"/>
+            <a:endParaRPr lang="en-US"/>
           </a:p>
         </p:txBody>
       </p:sp>
@@ -4220,7 +4220,7 @@
           <a:bodyPr/>
           <a:lstStyle/>
           <a:p>
-            <a:endParaRPr lang="en-US" dirty="0"/>
+            <a:endParaRPr lang="en-US"/>
           </a:p>
         </p:txBody>
       </p:sp>
@@ -4322,11 +4322,11 @@
           <a:lstStyle/>
           <a:p>
             <a:fld id="{D57F1E4F-1CFF-5643-939E-217C01CDF565}" type="slidenum">
-              <a:rPr lang="en-US" dirty="0"/>
+              <a:rPr lang="en-US"/>
               <a:pPr/>
               <a:t>‹#›</a:t>
             </a:fld>
-            <a:endParaRPr lang="en-US" dirty="0"/>
+            <a:endParaRPr lang="en-US"/>
           </a:p>
         </p:txBody>
       </p:sp>
@@ -4371,11 +4371,11 @@
           <a:lstStyle/>
           <a:p>
             <a:fld id="{B61BEF0D-F0BB-DE4B-95CE-6DB70DBA9567}" type="datetimeFigureOut">
-              <a:rPr lang="en-US" dirty="0"/>
+              <a:rPr lang="en-US"/>
               <a:pPr/>
-              <a:t>12/26/2016</a:t>
+              <a:t>1/4/2017</a:t>
             </a:fld>
-            <a:endParaRPr lang="en-US" dirty="0"/>
+            <a:endParaRPr lang="en-US"/>
           </a:p>
         </p:txBody>
       </p:sp>
@@ -4394,7 +4394,7 @@
           <a:bodyPr/>
           <a:lstStyle/>
           <a:p>
-            <a:endParaRPr lang="en-US" dirty="0"/>
+            <a:endParaRPr lang="en-US"/>
           </a:p>
         </p:txBody>
       </p:sp>
@@ -4496,11 +4496,11 @@
           <a:lstStyle/>
           <a:p>
             <a:fld id="{D57F1E4F-1CFF-5643-939E-217C01CDF565}" type="slidenum">
-              <a:rPr lang="en-US" dirty="0"/>
+              <a:rPr lang="en-US"/>
               <a:pPr/>
               <a:t>‹#›</a:t>
             </a:fld>
-            <a:endParaRPr lang="en-US" dirty="0"/>
+            <a:endParaRPr lang="en-US"/>
           </a:p>
         </p:txBody>
       </p:sp>
@@ -4701,11 +4701,11 @@
           <a:lstStyle/>
           <a:p>
             <a:fld id="{B61BEF0D-F0BB-DE4B-95CE-6DB70DBA9567}" type="datetimeFigureOut">
-              <a:rPr lang="en-US" dirty="0"/>
+              <a:rPr lang="en-US"/>
               <a:pPr/>
-              <a:t>12/26/2016</a:t>
+              <a:t>1/4/2017</a:t>
             </a:fld>
-            <a:endParaRPr lang="en-US" dirty="0"/>
+            <a:endParaRPr lang="en-US"/>
           </a:p>
         </p:txBody>
       </p:sp>
@@ -4724,7 +4724,7 @@
           <a:bodyPr/>
           <a:lstStyle/>
           <a:p>
-            <a:endParaRPr lang="en-US" dirty="0"/>
+            <a:endParaRPr lang="en-US"/>
           </a:p>
         </p:txBody>
       </p:sp>
@@ -4826,11 +4826,11 @@
           <a:lstStyle/>
           <a:p>
             <a:fld id="{D57F1E4F-1CFF-5643-939E-217C01CDF565}" type="slidenum">
-              <a:rPr lang="en-US" dirty="0"/>
+              <a:rPr lang="en-US"/>
               <a:pPr/>
               <a:t>‹#›</a:t>
             </a:fld>
-            <a:endParaRPr lang="en-US" dirty="0"/>
+            <a:endParaRPr lang="en-US"/>
           </a:p>
         </p:txBody>
       </p:sp>
@@ -4956,7 +4956,6 @@
               <a:rPr lang="en-US"/>
               <a:t>Click icon to add picture</a:t>
             </a:r>
-            <a:endParaRPr lang="en-US" dirty="0"/>
           </a:p>
         </p:txBody>
       </p:sp>
@@ -5043,11 +5042,11 @@
           <a:lstStyle/>
           <a:p>
             <a:fld id="{B61BEF0D-F0BB-DE4B-95CE-6DB70DBA9567}" type="datetimeFigureOut">
-              <a:rPr lang="en-US" dirty="0"/>
+              <a:rPr lang="en-US"/>
               <a:pPr/>
-              <a:t>12/26/2016</a:t>
+              <a:t>1/4/2017</a:t>
             </a:fld>
-            <a:endParaRPr lang="en-US" dirty="0"/>
+            <a:endParaRPr lang="en-US"/>
           </a:p>
         </p:txBody>
       </p:sp>
@@ -5066,7 +5065,7 @@
           <a:bodyPr/>
           <a:lstStyle/>
           <a:p>
-            <a:endParaRPr lang="en-US" dirty="0"/>
+            <a:endParaRPr lang="en-US"/>
           </a:p>
         </p:txBody>
       </p:sp>
@@ -5173,11 +5172,11 @@
           <a:lstStyle/>
           <a:p>
             <a:fld id="{D57F1E4F-1CFF-5643-939E-217C01CDF565}" type="slidenum">
-              <a:rPr lang="en-US" dirty="0"/>
+              <a:rPr lang="en-US"/>
               <a:pPr/>
               <a:t>‹#›</a:t>
             </a:fld>
-            <a:endParaRPr lang="en-US" dirty="0"/>
+            <a:endParaRPr lang="en-US"/>
           </a:p>
         </p:txBody>
       </p:sp>
@@ -7157,11 +7156,11 @@
           </a:lstStyle>
           <a:p>
             <a:fld id="{B61BEF0D-F0BB-DE4B-95CE-6DB70DBA9567}" type="datetimeFigureOut">
-              <a:rPr lang="en-US" dirty="0"/>
+              <a:rPr lang="en-US"/>
               <a:pPr/>
-              <a:t>12/26/2016</a:t>
+              <a:t>1/4/2017</a:t>
             </a:fld>
-            <a:endParaRPr lang="en-US" dirty="0"/>
+            <a:endParaRPr lang="en-US"/>
           </a:p>
         </p:txBody>
       </p:sp>
@@ -7198,7 +7197,7 @@
             </a:lvl1pPr>
           </a:lstStyle>
           <a:p>
-            <a:endParaRPr lang="en-US" dirty="0"/>
+            <a:endParaRPr lang="en-US"/>
           </a:p>
         </p:txBody>
       </p:sp>
@@ -7234,11 +7233,11 @@
           </a:lstStyle>
           <a:p>
             <a:fld id="{D57F1E4F-1CFF-5643-939E-217C01CDF565}" type="slidenum">
-              <a:rPr lang="en-US" dirty="0"/>
+              <a:rPr lang="en-US"/>
               <a:pPr/>
               <a:t>‹#›</a:t>
             </a:fld>
-            <a:endParaRPr lang="en-US" dirty="0"/>
+            <a:endParaRPr lang="en-US"/>
           </a:p>
         </p:txBody>
       </p:sp>
@@ -7689,15 +7688,15 @@
           <a:lstStyle/>
           <a:p>
             <a:r>
-              <a:rPr lang="en-GB" sz="4000" baseline="50000" dirty="0"/>
+              <a:rPr lang="en-GB" sz="4000" baseline="50000"/>
               <a:t>Project</a:t>
             </a:r>
             <a:r>
-              <a:rPr lang="en-GB" baseline="30000" dirty="0"/>
+              <a:rPr lang="en-GB" baseline="30000"/>
               <a:t> </a:t>
             </a:r>
             <a:r>
-              <a:rPr lang="en-GB" dirty="0">
+              <a:rPr lang="en-GB">
                 <a:solidFill>
                   <a:schemeClr val="accent1"/>
                 </a:solidFill>
@@ -7723,7 +7722,7 @@
           <a:lstStyle/>
           <a:p>
             <a:r>
-              <a:rPr lang="en-GB" dirty="0"/>
+              <a:rPr lang="en-GB"/>
               <a:t>Vision, High Level Features, data and state models</a:t>
             </a:r>
           </a:p>
@@ -7775,7 +7774,7 @@
           <a:lstStyle/>
           <a:p>
             <a:r>
-              <a:rPr lang="en-GB" dirty="0">
+              <a:rPr lang="en-GB">
                 <a:solidFill>
                   <a:schemeClr val="accent1"/>
                 </a:solidFill>
@@ -7803,57 +7802,57 @@
           <a:lstStyle/>
           <a:p>
             <a:r>
-              <a:rPr lang="en-GB" dirty="0"/>
+              <a:rPr lang="en-GB"/>
               <a:t>We will provide a system that allows people to start and engage in conversations that are tethered to locations/points of interest within cities</a:t>
             </a:r>
           </a:p>
           <a:p>
             <a:r>
-              <a:rPr lang="en-GB" dirty="0"/>
+              <a:rPr lang="en-GB"/>
               <a:t>The system will provide people with a real-time, physical awareness of the ‘goings-on’ around their city. It will be built in a way that encourages the physical “navigation” of the day-today life and culture of a city.</a:t>
             </a:r>
           </a:p>
           <a:p>
             <a:r>
-              <a:rPr lang="en-GB" dirty="0"/>
+              <a:rPr lang="en-GB"/>
               <a:t>The system can support a number of use cases including buy not limited to:</a:t>
             </a:r>
           </a:p>
           <a:p>
             <a:pPr lvl="1"/>
             <a:r>
-              <a:rPr lang="en-GB" dirty="0"/>
+              <a:rPr lang="en-GB"/>
               <a:t>Events and gatherings – whether spontaneous, ‘one-off’ or frequent</a:t>
             </a:r>
           </a:p>
           <a:p>
             <a:pPr lvl="1"/>
             <a:r>
-              <a:rPr lang="en-GB" dirty="0"/>
+              <a:rPr lang="en-GB"/>
               <a:t>Local and national debate – encouraging dialogue and action in regards to important issues within communities</a:t>
             </a:r>
           </a:p>
           <a:p>
             <a:pPr lvl="1"/>
             <a:r>
-              <a:rPr lang="en-GB" dirty="0"/>
+              <a:rPr lang="en-GB"/>
               <a:t>Awareness – informing people of dangers, disruptions to public services or neighbourhood vigilance</a:t>
             </a:r>
           </a:p>
           <a:p>
             <a:pPr lvl="1"/>
             <a:r>
-              <a:rPr lang="en-GB" dirty="0"/>
+              <a:rPr lang="en-GB"/>
               <a:t>Supporting curiosity – allowing people to seek answers, learn and discover regarding  the ‘sights and sounds’ of a city</a:t>
             </a:r>
           </a:p>
           <a:p>
             <a:pPr lvl="1"/>
-            <a:endParaRPr lang="en-GB" dirty="0"/>
+            <a:endParaRPr lang="en-GB"/>
           </a:p>
           <a:p>
             <a:pPr lvl="1"/>
-            <a:endParaRPr lang="en-GB" dirty="0"/>
+            <a:endParaRPr lang="en-GB"/>
           </a:p>
         </p:txBody>
       </p:sp>
@@ -7903,7 +7902,7 @@
           <a:lstStyle/>
           <a:p>
             <a:r>
-              <a:rPr lang="en-GB" dirty="0">
+              <a:rPr lang="en-GB">
                 <a:solidFill>
                   <a:schemeClr val="accent1"/>
                 </a:solidFill>
@@ -7969,7 +7968,7 @@
                     <a:p>
                       <a:pPr algn="l" fontAlgn="b"/>
                       <a:r>
-                        <a:rPr lang="en-GB" sz="2400" b="0" i="0" u="none" strike="noStrike" dirty="0">
+                        <a:rPr lang="en-GB" sz="2400" b="0" i="0" u="none" strike="noStrike">
                           <a:solidFill>
                             <a:schemeClr val="bg1"/>
                           </a:solidFill>
@@ -7989,7 +7988,7 @@
                     <a:p>
                       <a:pPr algn="l" fontAlgn="b"/>
                       <a:r>
-                        <a:rPr lang="en-GB" sz="2400" b="0" i="0" u="none" strike="noStrike" dirty="0">
+                        <a:rPr lang="en-GB" sz="2400" b="0" i="0" u="none" strike="noStrike">
                           <a:solidFill>
                             <a:schemeClr val="bg1"/>
                           </a:solidFill>
@@ -8009,7 +8008,7 @@
                     <a:p>
                       <a:pPr algn="l" fontAlgn="b"/>
                       <a:r>
-                        <a:rPr lang="en-GB" sz="2400" b="0" i="0" u="none" strike="noStrike" dirty="0">
+                        <a:rPr lang="en-GB" sz="2400" b="0" i="0" u="none" strike="noStrike">
                           <a:solidFill>
                             <a:schemeClr val="bg1"/>
                           </a:solidFill>
@@ -8036,7 +8035,7 @@
                     <a:p>
                       <a:pPr algn="l" fontAlgn="b"/>
                       <a:r>
-                        <a:rPr lang="en-GB" sz="2400" b="0" i="0" u="none" strike="noStrike" dirty="0">
+                        <a:rPr lang="en-GB" sz="2400" b="0" i="0" u="none" strike="noStrike">
                           <a:solidFill>
                             <a:srgbClr val="000000"/>
                           </a:solidFill>
@@ -8056,7 +8055,7 @@
                     <a:p>
                       <a:pPr algn="l" fontAlgn="b"/>
                       <a:r>
-                        <a:rPr lang="en-GB" sz="2400" b="0" i="0" u="none" strike="noStrike" dirty="0">
+                        <a:rPr lang="en-GB" sz="2400" b="0" i="0" u="none" strike="noStrike">
                           <a:solidFill>
                             <a:srgbClr val="00B050"/>
                           </a:solidFill>
@@ -8076,7 +8075,7 @@
                     <a:p>
                       <a:pPr algn="l" fontAlgn="b"/>
                       <a:r>
-                        <a:rPr lang="en-GB" sz="2400" b="0" i="0" u="none" strike="noStrike" dirty="0">
+                        <a:rPr lang="en-GB" sz="2400" b="0" i="0" u="none" strike="noStrike">
                           <a:solidFill>
                             <a:srgbClr val="000000"/>
                           </a:solidFill>
@@ -8190,7 +8189,7 @@
                     <a:p>
                       <a:pPr algn="l" fontAlgn="b"/>
                       <a:r>
-                        <a:rPr lang="en-GB" sz="2400" b="0" i="0" u="none" strike="noStrike" dirty="0">
+                        <a:rPr lang="en-GB" sz="2400" b="0" i="0" u="none" strike="noStrike">
                           <a:solidFill>
                             <a:srgbClr val="00B050"/>
                           </a:solidFill>
@@ -8257,7 +8256,7 @@
                     <a:p>
                       <a:pPr algn="l" fontAlgn="b"/>
                       <a:r>
-                        <a:rPr lang="en-GB" sz="2400" b="0" i="0" u="none" strike="noStrike" dirty="0">
+                        <a:rPr lang="en-GB" sz="2400" b="0" i="0" u="none" strike="noStrike">
                           <a:solidFill>
                             <a:srgbClr val="000000"/>
                           </a:solidFill>
@@ -8324,7 +8323,7 @@
                     <a:p>
                       <a:pPr algn="l" fontAlgn="b"/>
                       <a:r>
-                        <a:rPr lang="en-GB" sz="2400" b="0" i="0" u="none" strike="noStrike" dirty="0">
+                        <a:rPr lang="en-GB" sz="2400" b="0" i="0" u="none" strike="noStrike">
                           <a:solidFill>
                             <a:srgbClr val="00B050"/>
                           </a:solidFill>
@@ -8391,7 +8390,7 @@
                     <a:p>
                       <a:pPr algn="l" fontAlgn="b"/>
                       <a:r>
-                        <a:rPr lang="en-GB" sz="2400" b="0" i="0" u="none" strike="noStrike" dirty="0">
+                        <a:rPr lang="en-GB" sz="2400" b="0" i="0" u="none" strike="noStrike">
                           <a:solidFill>
                             <a:srgbClr val="00B050"/>
                           </a:solidFill>
@@ -8458,7 +8457,7 @@
                     <a:p>
                       <a:pPr algn="l" fontAlgn="b"/>
                       <a:r>
-                        <a:rPr lang="en-GB" sz="2400" b="0" i="0" u="none" strike="noStrike" dirty="0">
+                        <a:rPr lang="en-GB" sz="2400" b="0" i="0" u="none" strike="noStrike">
                           <a:solidFill>
                             <a:srgbClr val="000000"/>
                           </a:solidFill>
@@ -8592,7 +8591,7 @@
                     <a:p>
                       <a:pPr algn="l" fontAlgn="b"/>
                       <a:r>
-                        <a:rPr lang="en-GB" sz="2400" b="0" i="0" u="none" strike="noStrike" dirty="0">
+                        <a:rPr lang="en-GB" sz="2400" b="0" i="0" u="none" strike="noStrike">
                           <a:solidFill>
                             <a:srgbClr val="00B050"/>
                           </a:solidFill>
@@ -8659,7 +8658,7 @@
                     <a:p>
                       <a:pPr algn="l" fontAlgn="b"/>
                       <a:r>
-                        <a:rPr lang="en-GB" sz="2400" b="0" i="0" u="none" strike="noStrike" dirty="0">
+                        <a:rPr lang="en-GB" sz="2400" b="0" i="0" u="none" strike="noStrike">
                           <a:solidFill>
                             <a:srgbClr val="00B050"/>
                           </a:solidFill>
@@ -8726,7 +8725,7 @@
                     <a:p>
                       <a:pPr algn="l" fontAlgn="b"/>
                       <a:r>
-                        <a:rPr lang="en-GB" sz="2400" b="0" i="0" u="none" strike="noStrike" dirty="0">
+                        <a:rPr lang="en-GB" sz="2400" b="0" i="0" u="none" strike="noStrike">
                           <a:solidFill>
                             <a:srgbClr val="00B050"/>
                           </a:solidFill>
@@ -8860,7 +8859,7 @@
                     <a:p>
                       <a:pPr algn="l" fontAlgn="b"/>
                       <a:r>
-                        <a:rPr lang="en-GB" sz="2400" b="0" i="0" u="none" strike="noStrike" dirty="0">
+                        <a:rPr lang="en-GB" sz="2400" b="0" i="0" u="none" strike="noStrike">
                           <a:solidFill>
                             <a:srgbClr val="000000"/>
                           </a:solidFill>
@@ -8880,7 +8879,7 @@
                     <a:p>
                       <a:pPr algn="l" fontAlgn="b"/>
                       <a:r>
-                        <a:rPr lang="en-GB" sz="2400" b="0" i="0" u="none" strike="noStrike" dirty="0">
+                        <a:rPr lang="en-GB" sz="2400" b="0" i="0" u="none" strike="noStrike">
                           <a:solidFill>
                             <a:srgbClr val="000000"/>
                           </a:solidFill>
@@ -8907,7 +8906,7 @@
                     <a:p>
                       <a:pPr algn="l" fontAlgn="b"/>
                       <a:r>
-                        <a:rPr lang="en-GB" sz="2400" b="0" i="0" u="none" strike="noStrike" dirty="0">
+                        <a:rPr lang="en-GB" sz="2400" b="0" i="0" u="none" strike="noStrike">
                           <a:solidFill>
                             <a:srgbClr val="000000"/>
                           </a:solidFill>
@@ -8927,7 +8926,7 @@
                     <a:p>
                       <a:pPr algn="l" fontAlgn="b"/>
                       <a:r>
-                        <a:rPr lang="en-GB" sz="2400" b="0" i="0" u="none" strike="noStrike" dirty="0">
+                        <a:rPr lang="en-GB" sz="2400" b="0" i="0" u="none" strike="noStrike">
                           <a:solidFill>
                             <a:srgbClr val="000000"/>
                           </a:solidFill>
@@ -8963,7 +8962,7 @@
                         <a:defRPr/>
                       </a:pPr>
                       <a:r>
-                        <a:rPr lang="en-GB" sz="2400" b="0" i="0" u="none" strike="noStrike" dirty="0">
+                        <a:rPr lang="en-GB" sz="2400" b="0" i="0" u="none" strike="noStrike">
                           <a:solidFill>
                             <a:srgbClr val="000000"/>
                           </a:solidFill>
@@ -8990,7 +8989,7 @@
                     <a:p>
                       <a:pPr algn="l" fontAlgn="b"/>
                       <a:r>
-                        <a:rPr lang="en-GB" sz="2400" b="0" i="0" u="none" strike="noStrike" dirty="0">
+                        <a:rPr lang="en-GB" sz="2400" b="0" i="0" u="none" strike="noStrike">
                           <a:solidFill>
                             <a:srgbClr val="000000"/>
                           </a:solidFill>
@@ -9010,7 +9009,7 @@
                     <a:p>
                       <a:pPr algn="l" fontAlgn="b"/>
                       <a:r>
-                        <a:rPr lang="en-GB" sz="2400" b="0" i="0" u="none" strike="noStrike" dirty="0">
+                        <a:rPr lang="en-GB" sz="2400" b="0" i="0" u="none" strike="noStrike">
                           <a:solidFill>
                             <a:srgbClr val="000000"/>
                           </a:solidFill>
@@ -9030,7 +9029,7 @@
                     <a:p>
                       <a:pPr algn="l" fontAlgn="b"/>
                       <a:r>
-                        <a:rPr lang="en-GB" sz="2400" b="0" i="0" u="none" strike="noStrike" dirty="0">
+                        <a:rPr lang="en-GB" sz="2400" b="0" i="0" u="none" strike="noStrike">
                           <a:solidFill>
                             <a:srgbClr val="000000"/>
                           </a:solidFill>
@@ -9057,7 +9056,7 @@
                     <a:p>
                       <a:pPr algn="l" fontAlgn="b"/>
                       <a:r>
-                        <a:rPr lang="en-GB" sz="2400" b="0" i="0" u="none" strike="noStrike" dirty="0">
+                        <a:rPr lang="en-GB" sz="2400" b="0" i="0" u="none" strike="noStrike">
                           <a:solidFill>
                             <a:srgbClr val="000000"/>
                           </a:solidFill>
@@ -9077,7 +9076,7 @@
                     <a:p>
                       <a:pPr algn="l" fontAlgn="b"/>
                       <a:r>
-                        <a:rPr lang="en-GB" sz="2400" b="0" i="0" u="none" strike="noStrike" dirty="0">
+                        <a:rPr lang="en-GB" sz="2400" b="0" i="0" u="none" strike="noStrike">
                           <a:solidFill>
                             <a:srgbClr val="000000"/>
                           </a:solidFill>
@@ -9087,7 +9086,7 @@
                         <a:t>Notifications</a:t>
                       </a:r>
                       <a:r>
-                        <a:rPr lang="en-GB" sz="2400" b="0" i="0" u="none" strike="noStrike" baseline="0" dirty="0">
+                        <a:rPr lang="en-GB" sz="2400" b="0" i="0" u="none" strike="noStrike" baseline="0">
                           <a:solidFill>
                             <a:srgbClr val="000000"/>
                           </a:solidFill>
@@ -9096,7 +9095,7 @@
                         </a:rPr>
                         <a:t> (including additive and “near me” ones)</a:t>
                       </a:r>
-                      <a:endParaRPr lang="en-GB" sz="2400" b="0" i="0" u="none" strike="noStrike" dirty="0">
+                      <a:endParaRPr lang="en-GB" sz="2400" b="0" i="0" u="none" strike="noStrike">
                         <a:solidFill>
                           <a:srgbClr val="000000"/>
                         </a:solidFill>
@@ -9114,7 +9113,7 @@
                     <a:p>
                       <a:pPr algn="l" fontAlgn="b"/>
                       <a:r>
-                        <a:rPr lang="en-GB" sz="2400" b="0" i="0" u="none" strike="noStrike" dirty="0">
+                        <a:rPr lang="en-GB" sz="2400" b="0" i="0" u="none" strike="noStrike">
                           <a:solidFill>
                             <a:srgbClr val="000000"/>
                           </a:solidFill>
@@ -9141,7 +9140,7 @@
                     <a:p>
                       <a:pPr algn="l" fontAlgn="b"/>
                       <a:r>
-                        <a:rPr lang="en-GB" sz="2400" b="0" i="0" u="none" strike="noStrike" dirty="0">
+                        <a:rPr lang="en-GB" sz="2400" b="0" i="0" u="none" strike="noStrike">
                           <a:solidFill>
                             <a:srgbClr val="000000"/>
                           </a:solidFill>
@@ -9161,7 +9160,7 @@
                     <a:p>
                       <a:pPr algn="l" fontAlgn="b"/>
                       <a:r>
-                        <a:rPr lang="en-GB" sz="2400" b="0" i="0" u="none" strike="noStrike" dirty="0">
+                        <a:rPr lang="en-GB" sz="2400" b="0" i="0" u="none" strike="noStrike">
                           <a:solidFill>
                             <a:srgbClr val="000000"/>
                           </a:solidFill>
@@ -9171,7 +9170,7 @@
                         <a:t>Guidance /</a:t>
                       </a:r>
                       <a:r>
-                        <a:rPr lang="en-GB" sz="2400" b="0" i="0" u="none" strike="noStrike" baseline="0" dirty="0">
+                        <a:rPr lang="en-GB" sz="2400" b="0" i="0" u="none" strike="noStrike" baseline="0">
                           <a:solidFill>
                             <a:srgbClr val="000000"/>
                           </a:solidFill>
@@ -9180,7 +9179,7 @@
                         </a:rPr>
                         <a:t> initial setup help</a:t>
                       </a:r>
-                      <a:endParaRPr lang="en-GB" sz="2400" b="0" i="0" u="none" strike="noStrike" dirty="0">
+                      <a:endParaRPr lang="en-GB" sz="2400" b="0" i="0" u="none" strike="noStrike">
                         <a:solidFill>
                           <a:srgbClr val="000000"/>
                         </a:solidFill>
@@ -9198,7 +9197,7 @@
                     <a:p>
                       <a:pPr algn="l" fontAlgn="b"/>
                       <a:r>
-                        <a:rPr lang="en-GB" sz="2400" b="0" i="0" u="none" strike="noStrike" dirty="0">
+                        <a:rPr lang="en-GB" sz="2400" b="0" i="0" u="none" strike="noStrike">
                           <a:solidFill>
                             <a:srgbClr val="000000"/>
                           </a:solidFill>
@@ -9225,7 +9224,7 @@
                     <a:p>
                       <a:pPr algn="l" fontAlgn="b"/>
                       <a:r>
-                        <a:rPr lang="en-GB" sz="2400" b="0" i="0" u="none" strike="noStrike" dirty="0">
+                        <a:rPr lang="en-GB" sz="2400" b="0" i="0" u="none" strike="noStrike">
                           <a:solidFill>
                             <a:srgbClr val="000000"/>
                           </a:solidFill>
@@ -9245,7 +9244,7 @@
                     <a:p>
                       <a:pPr algn="l" fontAlgn="b"/>
                       <a:r>
-                        <a:rPr lang="en-GB" sz="2400" b="0" i="0" u="none" strike="noStrike" dirty="0">
+                        <a:rPr lang="en-GB" sz="2400" b="0" i="0" u="none" strike="noStrike">
                           <a:solidFill>
                             <a:srgbClr val="000000"/>
                           </a:solidFill>
@@ -9265,7 +9264,7 @@
                     <a:p>
                       <a:pPr algn="l" fontAlgn="b"/>
                       <a:r>
-                        <a:rPr lang="en-GB" sz="2400" b="0" i="0" u="none" strike="noStrike" dirty="0">
+                        <a:rPr lang="en-GB" sz="2400" b="0" i="0" u="none" strike="noStrike">
                           <a:solidFill>
                             <a:srgbClr val="000000"/>
                           </a:solidFill>
@@ -9328,7 +9327,7 @@
           <a:p>
             <a:pPr algn="ctr"/>
             <a:r>
-              <a:rPr lang="en-GB" dirty="0"/>
+              <a:rPr lang="en-GB"/>
               <a:t>Feature for search?</a:t>
             </a:r>
           </a:p>
@@ -9374,7 +9373,7 @@
           <a:p>
             <a:pPr algn="ctr"/>
             <a:r>
-              <a:rPr lang="en-GB" dirty="0"/>
+              <a:rPr lang="en-GB"/>
               <a:t>Need to think about implications on DM and WFs</a:t>
             </a:r>
           </a:p>
@@ -9420,7 +9419,7 @@
           <a:p>
             <a:pPr algn="ctr"/>
             <a:r>
-              <a:rPr lang="en-GB" dirty="0"/>
+              <a:rPr lang="en-GB"/>
               <a:t>Need to think about implications on DM and WFs</a:t>
             </a:r>
           </a:p>
@@ -9466,7 +9465,7 @@
           <a:p>
             <a:pPr algn="ctr"/>
             <a:r>
-              <a:rPr lang="en-GB" dirty="0"/>
+              <a:rPr lang="en-GB"/>
               <a:t>Need scenarios &amp; maybe whole own feature set?</a:t>
             </a:r>
           </a:p>
@@ -9523,7 +9522,7 @@
           <a:lstStyle/>
           <a:p>
             <a:r>
-              <a:rPr lang="en-GB" dirty="0">
+              <a:rPr lang="en-GB">
                 <a:solidFill>
                   <a:schemeClr val="accent1"/>
                 </a:solidFill>
@@ -9570,7 +9569,7 @@
           <a:p>
             <a:pPr algn="ctr"/>
             <a:r>
-              <a:rPr lang="en-GB" dirty="0"/>
+              <a:rPr lang="en-GB"/>
               <a:t>Thread</a:t>
             </a:r>
           </a:p>
@@ -9732,7 +9731,7 @@
           <a:lstStyle/>
           <a:p>
             <a:r>
-              <a:rPr lang="en-GB" dirty="0"/>
+              <a:rPr lang="en-GB"/>
               <a:t>0..*</a:t>
             </a:r>
           </a:p>
@@ -9761,7 +9760,7 @@
           <a:lstStyle/>
           <a:p>
             <a:r>
-              <a:rPr lang="en-GB" dirty="0"/>
+              <a:rPr lang="en-GB"/>
               <a:t>1</a:t>
             </a:r>
           </a:p>
@@ -9790,7 +9789,7 @@
           <a:lstStyle/>
           <a:p>
             <a:r>
-              <a:rPr lang="en-GB" dirty="0"/>
+              <a:rPr lang="en-GB"/>
               <a:t>0..*</a:t>
             </a:r>
           </a:p>
@@ -9819,7 +9818,7 @@
           <a:lstStyle/>
           <a:p>
             <a:r>
-              <a:rPr lang="en-GB" dirty="0"/>
+              <a:rPr lang="en-GB"/>
               <a:t>1</a:t>
             </a:r>
           </a:p>
@@ -9848,7 +9847,7 @@
           <a:lstStyle/>
           <a:p>
             <a:r>
-              <a:rPr lang="en-GB" dirty="0"/>
+              <a:rPr lang="en-GB"/>
               <a:t>1</a:t>
             </a:r>
           </a:p>
@@ -9877,7 +9876,7 @@
           <a:lstStyle/>
           <a:p>
             <a:r>
-              <a:rPr lang="en-GB" dirty="0"/>
+              <a:rPr lang="en-GB"/>
               <a:t>0..*</a:t>
             </a:r>
           </a:p>
@@ -9906,7 +9905,7 @@
           <a:lstStyle/>
           <a:p>
             <a:r>
-              <a:rPr lang="en-GB" dirty="0"/>
+              <a:rPr lang="en-GB"/>
               <a:t>1</a:t>
             </a:r>
           </a:p>
@@ -9935,7 +9934,7 @@
           <a:lstStyle/>
           <a:p>
             <a:r>
-              <a:rPr lang="en-GB" dirty="0"/>
+              <a:rPr lang="en-GB"/>
               <a:t>0..*</a:t>
             </a:r>
           </a:p>
@@ -9995,7 +9994,7 @@
           <a:lstStyle/>
           <a:p>
             <a:r>
-              <a:rPr lang="en-GB" dirty="0"/>
+              <a:rPr lang="en-GB"/>
               <a:t>1</a:t>
             </a:r>
           </a:p>
@@ -10024,7 +10023,7 @@
           <a:lstStyle/>
           <a:p>
             <a:r>
-              <a:rPr lang="en-GB" dirty="0"/>
+              <a:rPr lang="en-GB"/>
               <a:t>1..*</a:t>
             </a:r>
           </a:p>
@@ -10067,7 +10066,7 @@
           <a:p>
             <a:pPr algn="ctr"/>
             <a:r>
-              <a:rPr lang="en-GB" dirty="0"/>
+              <a:rPr lang="en-GB"/>
               <a:t>User</a:t>
             </a:r>
           </a:p>
@@ -10110,7 +10109,7 @@
           <a:p>
             <a:pPr algn="ctr"/>
             <a:r>
-              <a:rPr lang="en-GB" dirty="0"/>
+              <a:rPr lang="en-GB"/>
               <a:t>Ticket</a:t>
             </a:r>
           </a:p>
@@ -10153,7 +10152,7 @@
           <a:p>
             <a:pPr algn="ctr"/>
             <a:r>
-              <a:rPr lang="en-GB" dirty="0"/>
+              <a:rPr lang="en-GB"/>
               <a:t>Message</a:t>
             </a:r>
           </a:p>
@@ -10212,7 +10211,7 @@
           <a:lstStyle/>
           <a:p>
             <a:r>
-              <a:rPr lang="en-GB" sz="2400" dirty="0">
+              <a:rPr lang="en-GB" sz="2400">
                 <a:solidFill>
                   <a:schemeClr val="accent1"/>
                 </a:solidFill>
@@ -10220,14 +10219,14 @@
               <a:t>Logical data model</a:t>
             </a:r>
             <a:br>
-              <a:rPr lang="en-GB" sz="2400" dirty="0">
+              <a:rPr lang="en-GB" sz="2400">
                 <a:solidFill>
                   <a:schemeClr val="accent1"/>
                 </a:solidFill>
               </a:rPr>
             </a:br>
             <a:r>
-              <a:rPr lang="en-GB" sz="2400" dirty="0">
+              <a:rPr lang="en-GB" sz="2400">
                 <a:solidFill>
                   <a:schemeClr val="accent1"/>
                 </a:solidFill>
@@ -10288,7 +10287,7 @@
             <a:p>
               <a:pPr algn="ctr"/>
               <a:r>
-                <a:rPr lang="en-GB" dirty="0"/>
+                <a:rPr lang="en-GB"/>
                 <a:t>Message</a:t>
               </a:r>
             </a:p>
@@ -10336,47 +10335,47 @@
             <a:lstStyle/>
             <a:p>
               <a:r>
-                <a:rPr lang="en-GB" dirty="0"/>
+                <a:rPr lang="en-GB"/>
                 <a:t>-body  </a:t>
               </a:r>
             </a:p>
             <a:p>
               <a:r>
-                <a:rPr lang="en-GB" dirty="0"/>
+                <a:rPr lang="en-GB"/>
                 <a:t>-headline</a:t>
               </a:r>
             </a:p>
             <a:p>
               <a:r>
-                <a:rPr lang="en-GB" dirty="0"/>
+                <a:rPr lang="en-GB"/>
                 <a:t>-timestamp</a:t>
               </a:r>
             </a:p>
             <a:p>
               <a:r>
-                <a:rPr lang="en-GB" dirty="0"/>
+                <a:rPr lang="en-GB"/>
                 <a:t>-</a:t>
               </a:r>
               <a:r>
-                <a:rPr lang="en-GB" dirty="0" err="1"/>
+                <a:rPr lang="en-GB" err="1"/>
                 <a:t>atLocation</a:t>
               </a:r>
               <a:r>
-                <a:rPr lang="en-GB" dirty="0"/>
+                <a:rPr lang="en-GB"/>
                 <a:t>? (</a:t>
               </a:r>
               <a:r>
-                <a:rPr lang="en-GB" dirty="0" err="1"/>
+                <a:rPr lang="en-GB" err="1"/>
                 <a:t>bol</a:t>
               </a:r>
               <a:r>
-                <a:rPr lang="en-GB" dirty="0"/>
+                <a:rPr lang="en-GB"/>
                 <a:t>)</a:t>
               </a:r>
             </a:p>
             <a:p>
               <a:r>
-                <a:rPr lang="en-GB" dirty="0"/>
+                <a:rPr lang="en-GB"/>
                 <a:t>-state</a:t>
               </a:r>
             </a:p>
@@ -10434,7 +10433,7 @@
             <a:p>
               <a:pPr algn="ctr"/>
               <a:r>
-                <a:rPr lang="en-GB" dirty="0"/>
+                <a:rPr lang="en-GB"/>
                 <a:t>User</a:t>
               </a:r>
             </a:p>
@@ -10482,68 +10481,68 @@
             <a:lstStyle/>
             <a:p>
               <a:r>
-                <a:rPr lang="en-GB" dirty="0"/>
+                <a:rPr lang="en-GB"/>
                 <a:t>-username  </a:t>
               </a:r>
             </a:p>
             <a:p>
               <a:r>
-                <a:rPr lang="en-GB" dirty="0"/>
+                <a:rPr lang="en-GB"/>
                 <a:t>-</a:t>
               </a:r>
               <a:r>
-                <a:rPr lang="en-GB" dirty="0" err="1"/>
+                <a:rPr lang="en-GB" err="1"/>
                 <a:t>profilePic</a:t>
               </a:r>
-              <a:endParaRPr lang="en-GB" dirty="0"/>
+              <a:endParaRPr lang="en-GB"/>
             </a:p>
             <a:p>
               <a:r>
-                <a:rPr lang="en-GB" dirty="0"/>
+                <a:rPr lang="en-GB"/>
                 <a:t>-</a:t>
               </a:r>
               <a:r>
-                <a:rPr lang="en-GB" dirty="0" err="1"/>
+                <a:rPr lang="en-GB" err="1"/>
                 <a:t>authAccount</a:t>
               </a:r>
-              <a:endParaRPr lang="en-GB" dirty="0"/>
+              <a:endParaRPr lang="en-GB"/>
             </a:p>
             <a:p>
               <a:r>
-                <a:rPr lang="en-GB" dirty="0"/>
+                <a:rPr lang="en-GB"/>
                 <a:t>-</a:t>
               </a:r>
               <a:r>
-                <a:rPr lang="en-GB" dirty="0" err="1"/>
+                <a:rPr lang="en-GB" err="1"/>
                 <a:t>firstName</a:t>
               </a:r>
-              <a:endParaRPr lang="en-GB" dirty="0"/>
+              <a:endParaRPr lang="en-GB"/>
             </a:p>
             <a:p>
               <a:r>
-                <a:rPr lang="en-GB" dirty="0"/>
+                <a:rPr lang="en-GB"/>
                 <a:t>-</a:t>
               </a:r>
               <a:r>
-                <a:rPr lang="en-GB" dirty="0" err="1"/>
+                <a:rPr lang="en-GB" err="1"/>
                 <a:t>surename</a:t>
               </a:r>
-              <a:endParaRPr lang="en-GB" dirty="0"/>
+              <a:endParaRPr lang="en-GB"/>
             </a:p>
             <a:p>
               <a:r>
-                <a:rPr lang="en-GB" dirty="0"/>
+                <a:rPr lang="en-GB"/>
                 <a:t>-</a:t>
               </a:r>
               <a:r>
-                <a:rPr lang="en-GB" dirty="0" err="1"/>
+                <a:rPr lang="en-GB" err="1"/>
                 <a:t>profileText</a:t>
               </a:r>
-              <a:endParaRPr lang="en-GB" dirty="0"/>
+              <a:endParaRPr lang="en-GB"/>
             </a:p>
             <a:p>
               <a:r>
-                <a:rPr lang="en-GB" dirty="0"/>
+                <a:rPr lang="en-GB"/>
                 <a:t>-score</a:t>
               </a:r>
             </a:p>
@@ -10601,7 +10600,7 @@
             <a:p>
               <a:pPr algn="ctr"/>
               <a:r>
-                <a:rPr lang="en-GB" dirty="0"/>
+                <a:rPr lang="en-GB"/>
                 <a:t>Thread</a:t>
               </a:r>
             </a:p>
@@ -10649,163 +10648,163 @@
             <a:lstStyle/>
             <a:p>
               <a:r>
-                <a:rPr lang="en-GB" dirty="0"/>
+                <a:rPr lang="en-GB"/>
                 <a:t>-topic (</a:t>
               </a:r>
               <a:r>
-                <a:rPr lang="en-GB" dirty="0" err="1"/>
+                <a:rPr lang="en-GB" err="1"/>
                 <a:t>enum</a:t>
               </a:r>
               <a:r>
-                <a:rPr lang="en-GB" dirty="0"/>
+                <a:rPr lang="en-GB"/>
                 <a:t>)  </a:t>
               </a:r>
             </a:p>
             <a:p>
               <a:r>
-                <a:rPr lang="en-GB" dirty="0"/>
+                <a:rPr lang="en-GB"/>
                 <a:t>-title</a:t>
               </a:r>
             </a:p>
             <a:p>
               <a:r>
-                <a:rPr lang="en-GB" dirty="0"/>
+                <a:rPr lang="en-GB"/>
                 <a:t>-</a:t>
               </a:r>
               <a:r>
-                <a:rPr lang="en-GB" dirty="0" err="1"/>
+                <a:rPr lang="en-GB" err="1"/>
                 <a:t>startDate</a:t>
               </a:r>
-              <a:endParaRPr lang="en-GB" dirty="0"/>
+              <a:endParaRPr lang="en-GB"/>
             </a:p>
             <a:p>
               <a:r>
-                <a:rPr lang="en-GB" dirty="0"/>
+                <a:rPr lang="en-GB"/>
                 <a:t>-</a:t>
               </a:r>
               <a:r>
-                <a:rPr lang="en-GB" dirty="0" err="1"/>
+                <a:rPr lang="en-GB" err="1"/>
                 <a:t>expiredDate</a:t>
               </a:r>
-              <a:endParaRPr lang="en-GB" dirty="0"/>
+              <a:endParaRPr lang="en-GB"/>
             </a:p>
             <a:p>
               <a:r>
-                <a:rPr lang="en-GB" dirty="0"/>
+                <a:rPr lang="en-GB"/>
                 <a:t>-latitude</a:t>
               </a:r>
             </a:p>
             <a:p>
               <a:r>
-                <a:rPr lang="en-GB" dirty="0"/>
+                <a:rPr lang="en-GB"/>
                 <a:t>-longitude</a:t>
               </a:r>
             </a:p>
             <a:p>
               <a:r>
-                <a:rPr lang="en-GB" dirty="0"/>
+                <a:rPr lang="en-GB"/>
                 <a:t>-</a:t>
               </a:r>
               <a:r>
-                <a:rPr lang="en-GB" dirty="0" err="1"/>
+                <a:rPr lang="en-GB" err="1"/>
                 <a:t>addressShort</a:t>
               </a:r>
-              <a:endParaRPr lang="en-GB" dirty="0"/>
+              <a:endParaRPr lang="en-GB"/>
             </a:p>
             <a:p>
               <a:r>
-                <a:rPr lang="en-GB" dirty="0"/>
+                <a:rPr lang="en-GB"/>
                 <a:t>-</a:t>
               </a:r>
               <a:r>
-                <a:rPr lang="en-GB" dirty="0" err="1"/>
+                <a:rPr lang="en-GB" err="1"/>
                 <a:t>addressLong</a:t>
               </a:r>
-              <a:endParaRPr lang="en-GB" dirty="0"/>
+              <a:endParaRPr lang="en-GB"/>
             </a:p>
             <a:p>
               <a:r>
-                <a:rPr lang="en-GB" dirty="0"/>
+                <a:rPr lang="en-GB"/>
                 <a:t>-</a:t>
               </a:r>
               <a:r>
-                <a:rPr lang="en-GB" dirty="0" err="1"/>
+                <a:rPr lang="en-GB" err="1"/>
                 <a:t>zoomLevel</a:t>
               </a:r>
-              <a:endParaRPr lang="en-GB" dirty="0"/>
+              <a:endParaRPr lang="en-GB"/>
             </a:p>
             <a:p>
               <a:r>
-                <a:rPr lang="en-GB" dirty="0"/>
+                <a:rPr lang="en-GB"/>
                 <a:t>-anchored? (</a:t>
               </a:r>
               <a:r>
-                <a:rPr lang="en-GB" dirty="0" err="1"/>
+                <a:rPr lang="en-GB" err="1"/>
                 <a:t>bol</a:t>
               </a:r>
               <a:r>
-                <a:rPr lang="en-GB" dirty="0"/>
+                <a:rPr lang="en-GB"/>
                 <a:t>)</a:t>
               </a:r>
             </a:p>
             <a:p>
               <a:r>
-                <a:rPr lang="en-GB" dirty="0"/>
+                <a:rPr lang="en-GB"/>
                 <a:t>-</a:t>
               </a:r>
               <a:r>
-                <a:rPr lang="en-GB" dirty="0" err="1"/>
+                <a:rPr lang="en-GB" err="1"/>
                 <a:t>healthPoints</a:t>
               </a:r>
-              <a:endParaRPr lang="en-GB" dirty="0"/>
+              <a:endParaRPr lang="en-GB"/>
             </a:p>
             <a:p>
               <a:r>
-                <a:rPr lang="en-GB" dirty="0"/>
+                <a:rPr lang="en-GB"/>
                 <a:t>-density</a:t>
               </a:r>
             </a:p>
             <a:p>
               <a:r>
-                <a:rPr lang="en-GB" dirty="0"/>
+                <a:rPr lang="en-GB"/>
                 <a:t>-state???</a:t>
               </a:r>
             </a:p>
             <a:p>
               <a:r>
-                <a:rPr lang="en-GB" dirty="0"/>
+                <a:rPr lang="en-GB"/>
                 <a:t>-</a:t>
               </a:r>
               <a:r>
-                <a:rPr lang="en-GB" dirty="0" err="1"/>
+                <a:rPr lang="en-GB" err="1"/>
                 <a:t>isPrivate</a:t>
               </a:r>
               <a:r>
-                <a:rPr lang="en-GB" dirty="0"/>
+                <a:rPr lang="en-GB"/>
                 <a:t>?</a:t>
               </a:r>
             </a:p>
             <a:p>
               <a:r>
-                <a:rPr lang="en-GB" dirty="0"/>
+                <a:rPr lang="en-GB"/>
                 <a:t>-</a:t>
               </a:r>
               <a:r>
-                <a:rPr lang="en-GB" dirty="0" err="1"/>
+                <a:rPr lang="en-GB" err="1"/>
                 <a:t>noViews</a:t>
               </a:r>
-              <a:endParaRPr lang="en-GB" dirty="0"/>
+              <a:endParaRPr lang="en-GB"/>
             </a:p>
             <a:p>
               <a:r>
-                <a:rPr lang="en-GB" dirty="0"/>
+                <a:rPr lang="en-GB"/>
                 <a:t>-</a:t>
               </a:r>
               <a:r>
-                <a:rPr lang="en-GB" dirty="0" err="1"/>
+                <a:rPr lang="en-GB" err="1"/>
                 <a:t>noDiscards</a:t>
               </a:r>
-              <a:endParaRPr lang="en-GB" dirty="0"/>
+              <a:endParaRPr lang="en-GB"/>
             </a:p>
           </p:txBody>
         </p:sp>
@@ -10861,7 +10860,7 @@
             <a:p>
               <a:pPr algn="ctr"/>
               <a:r>
-                <a:rPr lang="en-GB" dirty="0"/>
+                <a:rPr lang="en-GB"/>
                 <a:t>Ticket</a:t>
               </a:r>
             </a:p>
@@ -10909,55 +10908,55 @@
             <a:lstStyle/>
             <a:p>
               <a:r>
-                <a:rPr lang="en-GB" dirty="0"/>
+                <a:rPr lang="en-GB"/>
                 <a:t>-type (</a:t>
               </a:r>
               <a:r>
-                <a:rPr lang="en-GB" dirty="0" err="1"/>
+                <a:rPr lang="en-GB" err="1"/>
                 <a:t>enum</a:t>
               </a:r>
               <a:r>
-                <a:rPr lang="en-GB" dirty="0"/>
+                <a:rPr lang="en-GB"/>
                 <a:t>)  </a:t>
               </a:r>
             </a:p>
             <a:p>
               <a:r>
-                <a:rPr lang="en-GB" dirty="0"/>
+                <a:rPr lang="en-GB"/>
                 <a:t>-comment</a:t>
               </a:r>
             </a:p>
             <a:p>
               <a:r>
-                <a:rPr lang="en-GB" dirty="0"/>
+                <a:rPr lang="en-GB"/>
                 <a:t>-</a:t>
               </a:r>
               <a:r>
-                <a:rPr lang="en-GB" dirty="0" err="1"/>
+                <a:rPr lang="en-GB" err="1"/>
                 <a:t>accusedUser</a:t>
               </a:r>
-              <a:endParaRPr lang="en-GB" dirty="0"/>
+              <a:endParaRPr lang="en-GB"/>
             </a:p>
             <a:p>
               <a:r>
-                <a:rPr lang="en-GB" dirty="0"/>
+                <a:rPr lang="en-GB"/>
                 <a:t>-</a:t>
               </a:r>
               <a:r>
-                <a:rPr lang="en-GB" dirty="0" err="1"/>
+                <a:rPr lang="en-GB" err="1"/>
                 <a:t>ReporteeUser</a:t>
               </a:r>
-              <a:endParaRPr lang="en-GB" dirty="0"/>
+              <a:endParaRPr lang="en-GB"/>
             </a:p>
             <a:p>
               <a:r>
-                <a:rPr lang="en-GB" dirty="0"/>
+                <a:rPr lang="en-GB"/>
                 <a:t>-outcome</a:t>
               </a:r>
             </a:p>
             <a:p>
               <a:r>
-                <a:rPr lang="en-GB" dirty="0"/>
+                <a:rPr lang="en-GB"/>
                 <a:t>-state???</a:t>
               </a:r>
             </a:p>
@@ -11123,7 +11122,7 @@
           <a:lstStyle/>
           <a:p>
             <a:r>
-              <a:rPr lang="en-GB" dirty="0"/>
+              <a:rPr lang="en-GB"/>
               <a:t>0..*</a:t>
             </a:r>
           </a:p>
@@ -11152,7 +11151,7 @@
           <a:lstStyle/>
           <a:p>
             <a:r>
-              <a:rPr lang="en-GB" dirty="0"/>
+              <a:rPr lang="en-GB"/>
               <a:t>1</a:t>
             </a:r>
           </a:p>
@@ -11181,7 +11180,7 @@
           <a:lstStyle/>
           <a:p>
             <a:r>
-              <a:rPr lang="en-GB" dirty="0"/>
+              <a:rPr lang="en-GB"/>
               <a:t>0..*</a:t>
             </a:r>
           </a:p>
@@ -11210,7 +11209,7 @@
           <a:lstStyle/>
           <a:p>
             <a:r>
-              <a:rPr lang="en-GB" dirty="0"/>
+              <a:rPr lang="en-GB"/>
               <a:t>1</a:t>
             </a:r>
           </a:p>
@@ -11239,7 +11238,7 @@
           <a:lstStyle/>
           <a:p>
             <a:r>
-              <a:rPr lang="en-GB" dirty="0"/>
+              <a:rPr lang="en-GB"/>
               <a:t>1</a:t>
             </a:r>
           </a:p>
@@ -11268,7 +11267,7 @@
           <a:lstStyle/>
           <a:p>
             <a:r>
-              <a:rPr lang="en-GB" dirty="0"/>
+              <a:rPr lang="en-GB"/>
               <a:t>0..*</a:t>
             </a:r>
           </a:p>
@@ -11297,7 +11296,7 @@
           <a:lstStyle/>
           <a:p>
             <a:r>
-              <a:rPr lang="en-GB" dirty="0"/>
+              <a:rPr lang="en-GB"/>
               <a:t>1</a:t>
             </a:r>
           </a:p>
@@ -11326,7 +11325,7 @@
           <a:lstStyle/>
           <a:p>
             <a:r>
-              <a:rPr lang="en-GB" dirty="0"/>
+              <a:rPr lang="en-GB"/>
               <a:t>0..*</a:t>
             </a:r>
           </a:p>
@@ -11386,7 +11385,7 @@
           <a:lstStyle/>
           <a:p>
             <a:r>
-              <a:rPr lang="en-GB" dirty="0"/>
+              <a:rPr lang="en-GB"/>
               <a:t>1</a:t>
             </a:r>
           </a:p>
@@ -11415,7 +11414,7 @@
           <a:lstStyle/>
           <a:p>
             <a:r>
-              <a:rPr lang="en-GB" dirty="0"/>
+              <a:rPr lang="en-GB"/>
               <a:t>1..*</a:t>
             </a:r>
           </a:p>
@@ -11461,7 +11460,7 @@
           <a:p>
             <a:pPr algn="ctr"/>
             <a:r>
-              <a:rPr lang="en-GB" dirty="0"/>
+              <a:rPr lang="en-GB"/>
               <a:t>Attribute any related object dependant on authentication method?</a:t>
             </a:r>
           </a:p>
@@ -11507,7 +11506,7 @@
           <a:p>
             <a:pPr algn="ctr"/>
             <a:r>
-              <a:rPr lang="en-GB" dirty="0"/>
+              <a:rPr lang="en-GB"/>
               <a:t>Username from User class</a:t>
             </a:r>
           </a:p>
@@ -11553,7 +11552,7 @@
           <a:p>
             <a:pPr algn="ctr"/>
             <a:r>
-              <a:rPr lang="en-GB" dirty="0"/>
+              <a:rPr lang="en-GB"/>
               <a:t>Mute?</a:t>
             </a:r>
           </a:p>
@@ -11599,7 +11598,7 @@
           <a:p>
             <a:pPr algn="ctr"/>
             <a:r>
-              <a:rPr lang="en-GB" dirty="0"/>
+              <a:rPr lang="en-GB"/>
               <a:t>Topic or thread type?</a:t>
             </a:r>
           </a:p>
@@ -11691,8 +11690,8 @@
         </p:nvSpPr>
         <p:spPr>
           <a:xfrm>
-            <a:off x="352937" y="4959"/>
-            <a:ext cx="9383485" cy="1280890"/>
+            <a:off x="-179738" y="-1494970"/>
+            <a:ext cx="3609028" cy="1280890"/>
           </a:xfrm>
         </p:spPr>
         <p:txBody>
@@ -11702,7 +11701,7 @@
           <a:lstStyle/>
           <a:p>
             <a:r>
-              <a:rPr lang="en-GB" sz="2400" dirty="0">
+              <a:rPr lang="en-GB" sz="2400">
                 <a:solidFill>
                   <a:schemeClr val="accent1"/>
                 </a:solidFill>
@@ -11710,14 +11709,14 @@
               <a:t>Logical data model</a:t>
             </a:r>
             <a:br>
-              <a:rPr lang="en-GB" sz="2400" dirty="0">
+              <a:rPr lang="en-GB" sz="2400">
                 <a:solidFill>
                   <a:schemeClr val="accent1"/>
                 </a:solidFill>
               </a:rPr>
             </a:br>
             <a:r>
-              <a:rPr lang="en-GB" sz="2400" dirty="0">
+              <a:rPr lang="en-GB" sz="2400">
                 <a:solidFill>
                   <a:schemeClr val="accent1"/>
                 </a:solidFill>
@@ -11778,7 +11777,7 @@
             <a:p>
               <a:pPr algn="ctr"/>
               <a:r>
-                <a:rPr lang="en-GB" strike="sngStrike" dirty="0" err="1">
+                <a:rPr lang="en-GB" strike="sngStrike" err="1">
                   <a:solidFill>
                     <a:srgbClr val="7030A0"/>
                   </a:solidFill>
@@ -11786,10 +11785,10 @@
                 <a:t>Message</a:t>
               </a:r>
               <a:r>
-                <a:rPr lang="en-GB" dirty="0" err="1"/>
+                <a:rPr lang="en-GB" err="1"/>
                 <a:t>Post</a:t>
               </a:r>
-              <a:endParaRPr lang="en-GB" dirty="0"/>
+              <a:endParaRPr lang="en-GB"/>
             </a:p>
           </p:txBody>
         </p:sp>
@@ -11835,17 +11834,17 @@
             <a:lstStyle/>
             <a:p>
               <a:r>
-                <a:rPr lang="en-GB" dirty="0"/>
+                <a:rPr lang="en-GB"/>
                 <a:t>-body  </a:t>
               </a:r>
             </a:p>
             <a:p>
               <a:r>
-                <a:rPr lang="en-GB" dirty="0"/>
+                <a:rPr lang="en-GB"/>
                 <a:t>-</a:t>
               </a:r>
               <a:r>
-                <a:rPr lang="en-GB" strike="sngStrike" dirty="0">
+                <a:rPr lang="en-GB" strike="sngStrike">
                   <a:solidFill>
                     <a:srgbClr val="7030A0"/>
                   </a:solidFill>
@@ -11855,35 +11854,35 @@
             </a:p>
             <a:p>
               <a:r>
-                <a:rPr lang="en-GB" dirty="0"/>
+                <a:rPr lang="en-GB"/>
                 <a:t>-timestamp</a:t>
               </a:r>
             </a:p>
             <a:p>
               <a:r>
-                <a:rPr lang="en-GB" dirty="0"/>
+                <a:rPr lang="en-GB"/>
                 <a:t>-</a:t>
               </a:r>
               <a:r>
-                <a:rPr lang="en-GB" dirty="0" err="1"/>
+                <a:rPr lang="en-GB" err="1"/>
                 <a:t>atLocation</a:t>
               </a:r>
               <a:r>
-                <a:rPr lang="en-GB" dirty="0"/>
+                <a:rPr lang="en-GB"/>
                 <a:t>? (</a:t>
               </a:r>
               <a:r>
-                <a:rPr lang="en-GB" dirty="0" err="1"/>
+                <a:rPr lang="en-GB" err="1"/>
                 <a:t>bol</a:t>
               </a:r>
               <a:r>
-                <a:rPr lang="en-GB" dirty="0"/>
+                <a:rPr lang="en-GB"/>
                 <a:t>)</a:t>
               </a:r>
             </a:p>
             <a:p>
               <a:r>
-                <a:rPr lang="en-GB" dirty="0"/>
+                <a:rPr lang="en-GB"/>
                 <a:t>-state</a:t>
               </a:r>
             </a:p>
@@ -11941,7 +11940,7 @@
             <a:p>
               <a:pPr algn="ctr"/>
               <a:r>
-                <a:rPr lang="en-GB" dirty="0"/>
+                <a:rPr lang="en-GB"/>
                 <a:t>User</a:t>
               </a:r>
             </a:p>
@@ -11989,68 +11988,68 @@
             <a:lstStyle/>
             <a:p>
               <a:r>
-                <a:rPr lang="en-GB" dirty="0"/>
+                <a:rPr lang="en-GB"/>
                 <a:t>-username  </a:t>
               </a:r>
             </a:p>
             <a:p>
               <a:r>
-                <a:rPr lang="en-GB" dirty="0"/>
+                <a:rPr lang="en-GB"/>
                 <a:t>-</a:t>
               </a:r>
               <a:r>
-                <a:rPr lang="en-GB" dirty="0" err="1"/>
+                <a:rPr lang="en-GB" err="1"/>
                 <a:t>profilePic</a:t>
               </a:r>
-              <a:endParaRPr lang="en-GB" dirty="0"/>
+              <a:endParaRPr lang="en-GB"/>
             </a:p>
             <a:p>
               <a:r>
-                <a:rPr lang="en-GB" dirty="0"/>
+                <a:rPr lang="en-GB"/>
                 <a:t>-</a:t>
               </a:r>
               <a:r>
-                <a:rPr lang="en-GB" dirty="0" err="1"/>
+                <a:rPr lang="en-GB" err="1"/>
                 <a:t>authAccount</a:t>
               </a:r>
-              <a:endParaRPr lang="en-GB" dirty="0"/>
+              <a:endParaRPr lang="en-GB"/>
             </a:p>
             <a:p>
               <a:r>
-                <a:rPr lang="en-GB" dirty="0"/>
+                <a:rPr lang="en-GB"/>
                 <a:t>-</a:t>
               </a:r>
               <a:r>
-                <a:rPr lang="en-GB" dirty="0" err="1"/>
+                <a:rPr lang="en-GB" err="1"/>
                 <a:t>firstName</a:t>
               </a:r>
-              <a:endParaRPr lang="en-GB" dirty="0"/>
+              <a:endParaRPr lang="en-GB"/>
             </a:p>
             <a:p>
               <a:r>
-                <a:rPr lang="en-GB" dirty="0"/>
+                <a:rPr lang="en-GB"/>
                 <a:t>-</a:t>
               </a:r>
               <a:r>
-                <a:rPr lang="en-GB" dirty="0" err="1"/>
+                <a:rPr lang="en-GB" err="1"/>
                 <a:t>surename</a:t>
               </a:r>
-              <a:endParaRPr lang="en-GB" dirty="0"/>
+              <a:endParaRPr lang="en-GB"/>
             </a:p>
             <a:p>
               <a:r>
-                <a:rPr lang="en-GB" dirty="0"/>
+                <a:rPr lang="en-GB"/>
                 <a:t>-</a:t>
               </a:r>
               <a:r>
-                <a:rPr lang="en-GB" dirty="0" err="1"/>
+                <a:rPr lang="en-GB" err="1"/>
                 <a:t>profileText</a:t>
               </a:r>
-              <a:endParaRPr lang="en-GB" dirty="0"/>
+              <a:endParaRPr lang="en-GB"/>
             </a:p>
             <a:p>
               <a:r>
-                <a:rPr lang="en-GB" dirty="0"/>
+                <a:rPr lang="en-GB"/>
                 <a:t>-score</a:t>
               </a:r>
             </a:p>
@@ -12108,7 +12107,7 @@
             <a:p>
               <a:pPr algn="ctr"/>
               <a:r>
-                <a:rPr lang="en-GB" dirty="0"/>
+                <a:rPr lang="en-GB"/>
                 <a:t>Thread</a:t>
               </a:r>
             </a:p>
@@ -12156,167 +12155,159 @@
             <a:lstStyle/>
             <a:p>
               <a:r>
-                <a:rPr lang="en-GB" dirty="0"/>
+                <a:rPr lang="en-GB"/>
                 <a:t>-topic (</a:t>
               </a:r>
               <a:r>
-                <a:rPr lang="en-GB" dirty="0" err="1"/>
+                <a:rPr lang="en-GB" err="1"/>
                 <a:t>enum</a:t>
               </a:r>
               <a:r>
-                <a:rPr lang="en-GB" dirty="0"/>
+                <a:rPr lang="en-GB"/>
                 <a:t>)  </a:t>
               </a:r>
             </a:p>
             <a:p>
               <a:r>
-                <a:rPr lang="en-GB" dirty="0"/>
+                <a:rPr lang="en-GB"/>
                 <a:t>-title</a:t>
               </a:r>
             </a:p>
             <a:p>
               <a:r>
-                <a:rPr lang="en-GB" dirty="0"/>
+                <a:rPr lang="en-GB"/>
                 <a:t>-</a:t>
               </a:r>
               <a:r>
-                <a:rPr lang="en-GB" dirty="0" err="1"/>
+                <a:rPr lang="en-GB" err="1"/>
                 <a:t>startDate</a:t>
               </a:r>
-              <a:endParaRPr lang="en-GB" dirty="0"/>
+              <a:endParaRPr lang="en-GB"/>
             </a:p>
             <a:p>
               <a:r>
-                <a:rPr lang="en-GB" dirty="0"/>
+                <a:rPr lang="en-GB"/>
                 <a:t>-</a:t>
               </a:r>
               <a:r>
-                <a:rPr lang="en-GB" dirty="0" err="1"/>
+                <a:rPr lang="en-GB" err="1"/>
                 <a:t>expiredDate</a:t>
               </a:r>
-              <a:endParaRPr lang="en-GB" dirty="0"/>
+              <a:endParaRPr lang="en-GB"/>
             </a:p>
             <a:p>
               <a:r>
-                <a:rPr lang="en-GB" dirty="0"/>
+                <a:rPr lang="en-GB"/>
                 <a:t>-latitude</a:t>
               </a:r>
             </a:p>
             <a:p>
               <a:r>
-                <a:rPr lang="en-GB" dirty="0"/>
+                <a:rPr lang="en-GB"/>
                 <a:t>-longitude</a:t>
               </a:r>
             </a:p>
             <a:p>
               <a:r>
-                <a:rPr lang="en-GB" dirty="0"/>
+                <a:rPr lang="en-GB"/>
                 <a:t>-</a:t>
               </a:r>
               <a:r>
-                <a:rPr lang="en-GB" dirty="0" err="1"/>
+                <a:rPr lang="en-GB" err="1"/>
                 <a:t>addressShort</a:t>
               </a:r>
-              <a:endParaRPr lang="en-GB" dirty="0"/>
+              <a:endParaRPr lang="en-GB"/>
             </a:p>
             <a:p>
               <a:r>
-                <a:rPr lang="en-GB" dirty="0"/>
+                <a:rPr lang="en-GB"/>
                 <a:t>-</a:t>
               </a:r>
               <a:r>
-                <a:rPr lang="en-GB" dirty="0" err="1"/>
+                <a:rPr lang="en-GB" err="1"/>
                 <a:t>addressLong</a:t>
               </a:r>
-              <a:endParaRPr lang="en-GB" dirty="0"/>
+              <a:endParaRPr lang="en-GB"/>
             </a:p>
             <a:p>
               <a:r>
-                <a:rPr lang="en-GB" dirty="0"/>
+                <a:rPr lang="en-GB"/>
                 <a:t>-</a:t>
               </a:r>
               <a:r>
-                <a:rPr lang="en-GB" dirty="0" err="1"/>
+                <a:rPr lang="en-GB" err="1"/>
                 <a:t>zoomLevel</a:t>
               </a:r>
-              <a:endParaRPr lang="en-GB" dirty="0"/>
+              <a:endParaRPr lang="en-GB"/>
             </a:p>
             <a:p>
               <a:r>
-                <a:rPr lang="en-GB" dirty="0"/>
+                <a:rPr lang="en-GB"/>
                 <a:t>-anchored? (</a:t>
               </a:r>
               <a:r>
-                <a:rPr lang="en-GB" dirty="0" err="1"/>
+                <a:rPr lang="en-GB" err="1"/>
                 <a:t>bol</a:t>
               </a:r>
               <a:r>
-                <a:rPr lang="en-GB" dirty="0"/>
+                <a:rPr lang="en-GB"/>
                 <a:t>)</a:t>
               </a:r>
             </a:p>
             <a:p>
               <a:r>
-                <a:rPr lang="en-GB" dirty="0"/>
+                <a:rPr lang="en-GB"/>
                 <a:t>-</a:t>
               </a:r>
               <a:r>
-                <a:rPr lang="en-GB" dirty="0" err="1"/>
+                <a:rPr lang="en-GB" err="1"/>
                 <a:t>healthPoints</a:t>
               </a:r>
-              <a:endParaRPr lang="en-GB" dirty="0"/>
+              <a:endParaRPr lang="en-GB"/>
             </a:p>
             <a:p>
               <a:r>
-                <a:rPr lang="en-GB" dirty="0"/>
+                <a:rPr lang="en-GB"/>
                 <a:t>-density</a:t>
               </a:r>
             </a:p>
             <a:p>
               <a:r>
-                <a:rPr lang="en-GB" dirty="0"/>
+                <a:rPr lang="en-GB"/>
                 <a:t>-state???</a:t>
               </a:r>
             </a:p>
             <a:p>
               <a:r>
-                <a:rPr lang="en-GB" dirty="0"/>
-                <a:t>-</a:t>
-              </a:r>
-              <a:r>
-                <a:rPr lang="en-GB" dirty="0" err="1"/>
-                <a:t>isPrivate</a:t>
-              </a:r>
-              <a:r>
-                <a:rPr lang="en-GB" dirty="0"/>
-                <a:t>?</a:t>
+                <a:rPr lang="en-GB"/>
+                <a:t>-isPublic?</a:t>
               </a:r>
             </a:p>
             <a:p>
               <a:r>
-                <a:rPr lang="en-GB" dirty="0"/>
+                <a:rPr lang="en-GB"/>
                 <a:t>-</a:t>
               </a:r>
               <a:r>
-                <a:rPr lang="en-GB" dirty="0" err="1"/>
+                <a:rPr lang="en-GB" err="1"/>
                 <a:t>noViews</a:t>
               </a:r>
-              <a:endParaRPr lang="en-GB" dirty="0"/>
+              <a:endParaRPr lang="en-GB"/>
             </a:p>
             <a:p>
               <a:r>
-                <a:rPr lang="en-GB" dirty="0"/>
+                <a:rPr lang="en-GB"/>
                 <a:t>-</a:t>
               </a:r>
               <a:r>
-                <a:rPr lang="en-GB" dirty="0" err="1"/>
+                <a:rPr lang="en-GB" err="1"/>
                 <a:t>noDiscards</a:t>
               </a:r>
-              <a:endParaRPr lang="en-GB" dirty="0"/>
+              <a:endParaRPr lang="en-GB"/>
             </a:p>
             <a:p>
               <a:r>
-                <a:rPr lang="en-GB" dirty="0">
+                <a:rPr lang="en-GB">
                   <a:solidFill>
                     <a:srgbClr val="7030A0"/>
                   </a:solidFill>
@@ -12378,7 +12369,7 @@
             <a:p>
               <a:pPr algn="ctr"/>
               <a:r>
-                <a:rPr lang="en-GB" dirty="0"/>
+                <a:rPr lang="en-GB"/>
                 <a:t>Ticket</a:t>
               </a:r>
             </a:p>
@@ -12426,55 +12417,55 @@
             <a:lstStyle/>
             <a:p>
               <a:r>
-                <a:rPr lang="en-GB" dirty="0"/>
+                <a:rPr lang="en-GB"/>
                 <a:t>-type (</a:t>
               </a:r>
               <a:r>
-                <a:rPr lang="en-GB" dirty="0" err="1"/>
+                <a:rPr lang="en-GB" err="1"/>
                 <a:t>enum</a:t>
               </a:r>
               <a:r>
-                <a:rPr lang="en-GB" dirty="0"/>
+                <a:rPr lang="en-GB"/>
                 <a:t>)  </a:t>
               </a:r>
             </a:p>
             <a:p>
               <a:r>
-                <a:rPr lang="en-GB" dirty="0"/>
+                <a:rPr lang="en-GB"/>
                 <a:t>-comment</a:t>
               </a:r>
             </a:p>
             <a:p>
               <a:r>
-                <a:rPr lang="en-GB" dirty="0"/>
+                <a:rPr lang="en-GB"/>
                 <a:t>-</a:t>
               </a:r>
               <a:r>
-                <a:rPr lang="en-GB" dirty="0" err="1"/>
+                <a:rPr lang="en-GB" err="1"/>
                 <a:t>accusedUser</a:t>
               </a:r>
-              <a:endParaRPr lang="en-GB" dirty="0"/>
+              <a:endParaRPr lang="en-GB"/>
             </a:p>
             <a:p>
               <a:r>
-                <a:rPr lang="en-GB" dirty="0"/>
+                <a:rPr lang="en-GB"/>
                 <a:t>-</a:t>
               </a:r>
               <a:r>
-                <a:rPr lang="en-GB" dirty="0" err="1"/>
+                <a:rPr lang="en-GB" err="1"/>
                 <a:t>ReporteeUser</a:t>
               </a:r>
-              <a:endParaRPr lang="en-GB" dirty="0"/>
+              <a:endParaRPr lang="en-GB"/>
             </a:p>
             <a:p>
               <a:r>
-                <a:rPr lang="en-GB" dirty="0"/>
+                <a:rPr lang="en-GB"/>
                 <a:t>-outcome</a:t>
               </a:r>
             </a:p>
             <a:p>
               <a:r>
-                <a:rPr lang="en-GB" dirty="0"/>
+                <a:rPr lang="en-GB"/>
                 <a:t>-state???</a:t>
               </a:r>
             </a:p>
@@ -12640,7 +12631,7 @@
           <a:lstStyle/>
           <a:p>
             <a:r>
-              <a:rPr lang="en-GB" dirty="0"/>
+              <a:rPr lang="en-GB"/>
               <a:t>0..*</a:t>
             </a:r>
           </a:p>
@@ -12669,7 +12660,7 @@
           <a:lstStyle/>
           <a:p>
             <a:r>
-              <a:rPr lang="en-GB" dirty="0"/>
+              <a:rPr lang="en-GB"/>
               <a:t>1</a:t>
             </a:r>
           </a:p>
@@ -12698,7 +12689,7 @@
           <a:lstStyle/>
           <a:p>
             <a:r>
-              <a:rPr lang="en-GB" dirty="0"/>
+              <a:rPr lang="en-GB"/>
               <a:t>0..*</a:t>
             </a:r>
           </a:p>
@@ -12727,7 +12718,7 @@
           <a:lstStyle/>
           <a:p>
             <a:r>
-              <a:rPr lang="en-GB" dirty="0"/>
+              <a:rPr lang="en-GB"/>
               <a:t>1</a:t>
             </a:r>
           </a:p>
@@ -12756,7 +12747,7 @@
           <a:lstStyle/>
           <a:p>
             <a:r>
-              <a:rPr lang="en-GB" dirty="0"/>
+              <a:rPr lang="en-GB"/>
               <a:t>1</a:t>
             </a:r>
           </a:p>
@@ -12785,7 +12776,7 @@
           <a:lstStyle/>
           <a:p>
             <a:r>
-              <a:rPr lang="en-GB" dirty="0"/>
+              <a:rPr lang="en-GB"/>
               <a:t>0..*</a:t>
             </a:r>
           </a:p>
@@ -12814,7 +12805,7 @@
           <a:lstStyle/>
           <a:p>
             <a:r>
-              <a:rPr lang="en-GB" dirty="0"/>
+              <a:rPr lang="en-GB"/>
               <a:t>1</a:t>
             </a:r>
           </a:p>
@@ -12843,7 +12834,7 @@
           <a:lstStyle/>
           <a:p>
             <a:r>
-              <a:rPr lang="en-GB" dirty="0"/>
+              <a:rPr lang="en-GB"/>
               <a:t>0..*</a:t>
             </a:r>
           </a:p>
@@ -12903,7 +12894,7 @@
           <a:lstStyle/>
           <a:p>
             <a:r>
-              <a:rPr lang="en-GB" dirty="0"/>
+              <a:rPr lang="en-GB"/>
               <a:t>1</a:t>
             </a:r>
           </a:p>
@@ -12932,7 +12923,7 @@
           <a:lstStyle/>
           <a:p>
             <a:r>
-              <a:rPr lang="en-GB" dirty="0"/>
+              <a:rPr lang="en-GB"/>
               <a:t>1..*</a:t>
             </a:r>
           </a:p>
@@ -12946,7 +12937,7 @@
         </p:nvSpPr>
         <p:spPr>
           <a:xfrm>
-            <a:off x="9994900" y="2057399"/>
+            <a:off x="9832938" y="2837931"/>
             <a:ext cx="1981510" cy="1516161"/>
           </a:xfrm>
           <a:prstGeom prst="wedgeRectCallout">
@@ -12978,7 +12969,7 @@
           <a:p>
             <a:pPr algn="ctr"/>
             <a:r>
-              <a:rPr lang="en-GB" dirty="0"/>
+              <a:rPr lang="en-GB"/>
               <a:t>Attribute any related object dependant on authentication method?</a:t>
             </a:r>
           </a:p>
@@ -13024,7 +13015,7 @@
           <a:p>
             <a:pPr algn="ctr"/>
             <a:r>
-              <a:rPr lang="en-GB" dirty="0"/>
+              <a:rPr lang="en-GB"/>
               <a:t>Username from User class</a:t>
             </a:r>
           </a:p>
@@ -13070,7 +13061,7 @@
           <a:p>
             <a:pPr algn="ctr"/>
             <a:r>
-              <a:rPr lang="en-GB" dirty="0"/>
+              <a:rPr lang="en-GB"/>
               <a:t>Mute?</a:t>
             </a:r>
           </a:p>
@@ -13084,13 +13075,13 @@
         </p:nvSpPr>
         <p:spPr>
           <a:xfrm>
-            <a:off x="415746" y="1692981"/>
+            <a:off x="6167831" y="126193"/>
             <a:ext cx="1981510" cy="758080"/>
           </a:xfrm>
           <a:prstGeom prst="wedgeRectCallout">
             <a:avLst>
-              <a:gd name="adj1" fmla="val 118961"/>
-              <a:gd name="adj2" fmla="val -49820"/>
+              <a:gd name="adj1" fmla="val -98587"/>
+              <a:gd name="adj2" fmla="val -111088"/>
             </a:avLst>
           </a:prstGeom>
         </p:spPr>
@@ -13116,7 +13107,7 @@
           <a:p>
             <a:pPr algn="ctr"/>
             <a:r>
-              <a:rPr lang="en-GB" dirty="0"/>
+              <a:rPr lang="en-GB"/>
               <a:t>Topic or thread type?</a:t>
             </a:r>
           </a:p>
@@ -13177,7 +13168,7 @@
             <a:p>
               <a:pPr algn="ctr"/>
               <a:r>
-                <a:rPr lang="en-GB" dirty="0"/>
+                <a:rPr lang="en-GB"/>
                 <a:t>Image</a:t>
               </a:r>
             </a:p>
@@ -13221,41 +13212,41 @@
             <a:lstStyle/>
             <a:p>
               <a:r>
-                <a:rPr lang="en-GB" dirty="0"/>
+                <a:rPr lang="en-GB"/>
                 <a:t>-</a:t>
               </a:r>
               <a:r>
-                <a:rPr lang="en-GB" dirty="0" err="1"/>
+                <a:rPr lang="en-GB" err="1"/>
                 <a:t>imageType</a:t>
               </a:r>
               <a:r>
-                <a:rPr lang="en-GB" dirty="0"/>
+                <a:rPr lang="en-GB"/>
                 <a:t>  </a:t>
               </a:r>
             </a:p>
             <a:p>
               <a:r>
-                <a:rPr lang="en-GB" dirty="0"/>
+                <a:rPr lang="en-GB"/>
                 <a:t>-image</a:t>
               </a:r>
             </a:p>
             <a:p>
               <a:r>
-                <a:rPr lang="en-GB" dirty="0"/>
+                <a:rPr lang="en-GB"/>
                 <a:t>-size</a:t>
               </a:r>
             </a:p>
             <a:p>
               <a:r>
-                <a:rPr lang="en-GB" dirty="0"/>
+                <a:rPr lang="en-GB"/>
                 <a:t>-</a:t>
               </a:r>
               <a:r>
-                <a:rPr lang="en-GB" dirty="0" err="1"/>
+                <a:rPr lang="en-GB" err="1"/>
                 <a:t>displayableForThread</a:t>
               </a:r>
               <a:r>
-                <a:rPr lang="en-GB" dirty="0"/>
+                <a:rPr lang="en-GB"/>
                 <a:t>?</a:t>
               </a:r>
             </a:p>
@@ -13317,7 +13308,7 @@
             <a:p>
               <a:pPr algn="ctr"/>
               <a:r>
-                <a:rPr lang="en-GB" dirty="0"/>
+                <a:rPr lang="en-GB"/>
                 <a:t>Message</a:t>
               </a:r>
             </a:p>
@@ -13361,7 +13352,7 @@
             <a:lstStyle/>
             <a:p>
               <a:r>
-                <a:rPr lang="en-GB" dirty="0"/>
+                <a:rPr lang="en-GB"/>
                 <a:t>-headline</a:t>
               </a:r>
             </a:p>
@@ -13408,7 +13399,7 @@
           <a:p>
             <a:pPr algn="ctr"/>
             <a:r>
-              <a:rPr lang="en-GB" dirty="0"/>
+              <a:rPr lang="en-GB"/>
               <a:t>Check out the DD model</a:t>
             </a:r>
           </a:p>
@@ -13455,6 +13446,621 @@
           <a:p>
             <a:pPr algn="ctr"/>
             <a:endParaRPr lang="en-GB"/>
+          </a:p>
+        </p:txBody>
+      </p:sp>
+      <p:grpSp>
+        <p:nvGrpSpPr>
+          <p:cNvPr id="78" name="Group 77"/>
+          <p:cNvGrpSpPr/>
+          <p:nvPr/>
+        </p:nvGrpSpPr>
+        <p:grpSpPr>
+          <a:xfrm>
+            <a:off x="11157759" y="-1445100"/>
+            <a:ext cx="2232838" cy="3481885"/>
+            <a:chOff x="16589346" y="2346523"/>
+            <a:chExt cx="1945759" cy="3467314"/>
+          </a:xfrm>
+        </p:grpSpPr>
+        <p:sp>
+          <p:nvSpPr>
+            <p:cNvPr id="79" name="Rectangle 78"/>
+            <p:cNvSpPr/>
+            <p:nvPr/>
+          </p:nvSpPr>
+          <p:spPr>
+            <a:xfrm>
+              <a:off x="16589347" y="2346523"/>
+              <a:ext cx="1945758" cy="467833"/>
+            </a:xfrm>
+            <a:prstGeom prst="rect">
+              <a:avLst/>
+            </a:prstGeom>
+          </p:spPr>
+          <p:style>
+            <a:lnRef idx="2">
+              <a:schemeClr val="accent3">
+                <a:shade val="50000"/>
+              </a:schemeClr>
+            </a:lnRef>
+            <a:fillRef idx="1">
+              <a:schemeClr val="accent3"/>
+            </a:fillRef>
+            <a:effectRef idx="0">
+              <a:schemeClr val="accent3"/>
+            </a:effectRef>
+            <a:fontRef idx="minor">
+              <a:schemeClr val="lt1"/>
+            </a:fontRef>
+          </p:style>
+          <p:txBody>
+            <a:bodyPr rtlCol="0" anchor="ctr"/>
+            <a:lstStyle/>
+            <a:p>
+              <a:pPr algn="ctr"/>
+              <a:r>
+                <a:rPr lang="en-GB"/>
+                <a:t>Map</a:t>
+              </a:r>
+            </a:p>
+          </p:txBody>
+        </p:sp>
+        <p:sp>
+          <p:nvSpPr>
+            <p:cNvPr id="80" name="Rectangle 79"/>
+            <p:cNvSpPr/>
+            <p:nvPr/>
+          </p:nvSpPr>
+          <p:spPr>
+            <a:xfrm>
+              <a:off x="16589346" y="2721191"/>
+              <a:ext cx="1945758" cy="3092646"/>
+            </a:xfrm>
+            <a:prstGeom prst="rect">
+              <a:avLst/>
+            </a:prstGeom>
+            <a:solidFill>
+              <a:schemeClr val="accent3">
+                <a:alpha val="50000"/>
+              </a:schemeClr>
+            </a:solidFill>
+            <a:ln>
+              <a:noFill/>
+            </a:ln>
+          </p:spPr>
+          <p:style>
+            <a:lnRef idx="0">
+              <a:scrgbClr r="0" g="0" b="0"/>
+            </a:lnRef>
+            <a:fillRef idx="0">
+              <a:scrgbClr r="0" g="0" b="0"/>
+            </a:fillRef>
+            <a:effectRef idx="0">
+              <a:scrgbClr r="0" g="0" b="0"/>
+            </a:effectRef>
+            <a:fontRef idx="minor">
+              <a:schemeClr val="lt1"/>
+            </a:fontRef>
+          </p:style>
+          <p:txBody>
+            <a:bodyPr rtlCol="0" anchor="ctr"/>
+            <a:lstStyle/>
+            <a:p>
+              <a:r>
+                <a:rPr lang="en-GB"/>
+                <a:t>-mapType (</a:t>
+              </a:r>
+              <a:r>
+                <a:rPr lang="en-GB" err="1"/>
+                <a:t>enum</a:t>
+              </a:r>
+              <a:r>
+                <a:rPr lang="en-GB"/>
+                <a:t>)  </a:t>
+              </a:r>
+            </a:p>
+            <a:p>
+              <a:r>
+                <a:rPr lang="en-GB"/>
+                <a:t>-title</a:t>
+              </a:r>
+            </a:p>
+            <a:p>
+              <a:r>
+                <a:rPr lang="en-GB"/>
+                <a:t>-description</a:t>
+              </a:r>
+            </a:p>
+            <a:p>
+              <a:r>
+                <a:rPr lang="en-GB"/>
+                <a:t>-</a:t>
+              </a:r>
+              <a:r>
+                <a:rPr lang="en-GB" err="1"/>
+                <a:t>startDate</a:t>
+              </a:r>
+              <a:endParaRPr lang="en-GB"/>
+            </a:p>
+            <a:p>
+              <a:r>
+                <a:rPr lang="en-GB"/>
+                <a:t>-</a:t>
+              </a:r>
+              <a:r>
+                <a:rPr lang="en-GB" err="1"/>
+                <a:t>endDate</a:t>
+              </a:r>
+              <a:endParaRPr lang="en-GB"/>
+            </a:p>
+            <a:p>
+              <a:r>
+                <a:rPr lang="en-GB"/>
+                <a:t>-area/city</a:t>
+              </a:r>
+            </a:p>
+            <a:p>
+              <a:r>
+                <a:rPr lang="en-GB"/>
+                <a:t>-</a:t>
+              </a:r>
+              <a:r>
+                <a:rPr lang="en-GB" err="1"/>
+                <a:t>mapTheme</a:t>
+              </a:r>
+              <a:endParaRPr lang="en-GB"/>
+            </a:p>
+            <a:p>
+              <a:r>
+                <a:rPr lang="en-GB"/>
+                <a:t>-isPublic?</a:t>
+              </a:r>
+            </a:p>
+            <a:p>
+              <a:r>
+                <a:rPr lang="en-GB"/>
+                <a:t>-</a:t>
+              </a:r>
+              <a:r>
+                <a:rPr lang="en-GB" err="1"/>
+                <a:t>noViews</a:t>
+              </a:r>
+              <a:endParaRPr lang="en-GB"/>
+            </a:p>
+            <a:p>
+              <a:r>
+                <a:rPr lang="en-GB">
+                  <a:solidFill>
+                    <a:schemeClr val="bg1"/>
+                  </a:solidFill>
+                </a:rPr>
+                <a:t>-thumbnail</a:t>
+              </a:r>
+            </a:p>
+          </p:txBody>
+        </p:sp>
+      </p:grpSp>
+      <p:cxnSp>
+        <p:nvCxnSpPr>
+          <p:cNvPr id="81" name="Straight Connector 80"/>
+          <p:cNvCxnSpPr>
+            <a:cxnSpLocks/>
+          </p:cNvCxnSpPr>
+          <p:nvPr/>
+        </p:nvCxnSpPr>
+        <p:spPr>
+          <a:xfrm>
+            <a:off x="5866279" y="-257706"/>
+            <a:ext cx="5291479" cy="22289"/>
+          </a:xfrm>
+          <a:prstGeom prst="line">
+            <a:avLst/>
+          </a:prstGeom>
+          <a:ln w="28575"/>
+        </p:spPr>
+        <p:style>
+          <a:lnRef idx="1">
+            <a:schemeClr val="accent1"/>
+          </a:lnRef>
+          <a:fillRef idx="0">
+            <a:schemeClr val="accent1"/>
+          </a:fillRef>
+          <a:effectRef idx="0">
+            <a:schemeClr val="accent1"/>
+          </a:effectRef>
+          <a:fontRef idx="minor">
+            <a:schemeClr val="tx1"/>
+          </a:fontRef>
+        </p:style>
+      </p:cxnSp>
+      <p:sp>
+        <p:nvSpPr>
+          <p:cNvPr id="93" name="TextBox 92"/>
+          <p:cNvSpPr txBox="1"/>
+          <p:nvPr/>
+        </p:nvSpPr>
+        <p:spPr>
+          <a:xfrm>
+            <a:off x="5866278" y="-592229"/>
+            <a:ext cx="603106" cy="369332"/>
+          </a:xfrm>
+          <a:prstGeom prst="rect">
+            <a:avLst/>
+          </a:prstGeom>
+          <a:noFill/>
+        </p:spPr>
+        <p:txBody>
+          <a:bodyPr wrap="square" rtlCol="0">
+            <a:spAutoFit/>
+          </a:bodyPr>
+          <a:lstStyle/>
+          <a:p>
+            <a:r>
+              <a:rPr lang="en-GB"/>
+              <a:t>0..*</a:t>
+            </a:r>
+          </a:p>
+        </p:txBody>
+      </p:sp>
+      <p:sp>
+        <p:nvSpPr>
+          <p:cNvPr id="94" name="TextBox 93"/>
+          <p:cNvSpPr txBox="1"/>
+          <p:nvPr/>
+        </p:nvSpPr>
+        <p:spPr>
+          <a:xfrm>
+            <a:off x="10856206" y="-667538"/>
+            <a:ext cx="603106" cy="369332"/>
+          </a:xfrm>
+          <a:prstGeom prst="rect">
+            <a:avLst/>
+          </a:prstGeom>
+          <a:noFill/>
+        </p:spPr>
+        <p:txBody>
+          <a:bodyPr wrap="square" rtlCol="0">
+            <a:spAutoFit/>
+          </a:bodyPr>
+          <a:lstStyle/>
+          <a:p>
+            <a:r>
+              <a:rPr lang="en-GB"/>
+              <a:t>1</a:t>
+            </a:r>
+          </a:p>
+        </p:txBody>
+      </p:sp>
+      <p:cxnSp>
+        <p:nvCxnSpPr>
+          <p:cNvPr id="95" name="Straight Connector 94"/>
+          <p:cNvCxnSpPr>
+            <a:cxnSpLocks/>
+          </p:cNvCxnSpPr>
+          <p:nvPr/>
+        </p:nvCxnSpPr>
+        <p:spPr>
+          <a:xfrm flipV="1">
+            <a:off x="9527460" y="387335"/>
+            <a:ext cx="1640255" cy="1506036"/>
+          </a:xfrm>
+          <a:prstGeom prst="line">
+            <a:avLst/>
+          </a:prstGeom>
+          <a:ln w="28575"/>
+        </p:spPr>
+        <p:style>
+          <a:lnRef idx="1">
+            <a:schemeClr val="accent1"/>
+          </a:lnRef>
+          <a:fillRef idx="0">
+            <a:schemeClr val="accent1"/>
+          </a:fillRef>
+          <a:effectRef idx="0">
+            <a:schemeClr val="accent1"/>
+          </a:effectRef>
+          <a:fontRef idx="minor">
+            <a:schemeClr val="tx1"/>
+          </a:fontRef>
+        </p:style>
+      </p:cxnSp>
+      <p:cxnSp>
+        <p:nvCxnSpPr>
+          <p:cNvPr id="96" name="Straight Connector 95"/>
+          <p:cNvCxnSpPr>
+            <a:cxnSpLocks/>
+          </p:cNvCxnSpPr>
+          <p:nvPr/>
+        </p:nvCxnSpPr>
+        <p:spPr>
+          <a:xfrm flipV="1">
+            <a:off x="9507547" y="1420705"/>
+            <a:ext cx="1640255" cy="1506036"/>
+          </a:xfrm>
+          <a:prstGeom prst="line">
+            <a:avLst/>
+          </a:prstGeom>
+          <a:ln w="28575"/>
+        </p:spPr>
+        <p:style>
+          <a:lnRef idx="1">
+            <a:schemeClr val="accent1"/>
+          </a:lnRef>
+          <a:fillRef idx="0">
+            <a:schemeClr val="accent1"/>
+          </a:fillRef>
+          <a:effectRef idx="0">
+            <a:schemeClr val="accent1"/>
+          </a:effectRef>
+          <a:fontRef idx="minor">
+            <a:schemeClr val="tx1"/>
+          </a:fontRef>
+        </p:style>
+      </p:cxnSp>
+      <p:sp>
+        <p:nvSpPr>
+          <p:cNvPr id="97" name="Rectangular Callout 4"/>
+          <p:cNvSpPr/>
+          <p:nvPr/>
+        </p:nvSpPr>
+        <p:spPr>
+          <a:xfrm>
+            <a:off x="13185417" y="998530"/>
+            <a:ext cx="1981510" cy="1516161"/>
+          </a:xfrm>
+          <a:prstGeom prst="wedgeRectCallout">
+            <a:avLst>
+              <a:gd name="adj1" fmla="val -199186"/>
+              <a:gd name="adj2" fmla="val 26268"/>
+            </a:avLst>
+          </a:prstGeom>
+        </p:spPr>
+        <p:style>
+          <a:lnRef idx="2">
+            <a:schemeClr val="accent1">
+              <a:shade val="50000"/>
+            </a:schemeClr>
+          </a:lnRef>
+          <a:fillRef idx="1">
+            <a:schemeClr val="accent1"/>
+          </a:fillRef>
+          <a:effectRef idx="0">
+            <a:schemeClr val="accent1"/>
+          </a:effectRef>
+          <a:fontRef idx="minor">
+            <a:schemeClr val="lt1"/>
+          </a:fontRef>
+        </p:style>
+        <p:txBody>
+          <a:bodyPr rtlCol="0" anchor="ctr"/>
+          <a:lstStyle/>
+          <a:p>
+            <a:pPr algn="ctr"/>
+            <a:r>
+              <a:rPr lang="en-GB"/>
+              <a:t>Check functional analysis training to check this is right</a:t>
+            </a:r>
+          </a:p>
+        </p:txBody>
+      </p:sp>
+      <p:sp>
+        <p:nvSpPr>
+          <p:cNvPr id="12" name="TextBox 11"/>
+          <p:cNvSpPr txBox="1"/>
+          <p:nvPr/>
+        </p:nvSpPr>
+        <p:spPr>
+          <a:xfrm rot="19200146">
+            <a:off x="9303018" y="1410488"/>
+            <a:ext cx="1702267" cy="261610"/>
+          </a:xfrm>
+          <a:prstGeom prst="rect">
+            <a:avLst/>
+          </a:prstGeom>
+          <a:noFill/>
+        </p:spPr>
+        <p:txBody>
+          <a:bodyPr wrap="square" rtlCol="0">
+            <a:spAutoFit/>
+          </a:bodyPr>
+          <a:lstStyle/>
+          <a:p>
+            <a:r>
+              <a:rPr lang="en-GB" sz="1100"/>
+              <a:t>particpant</a:t>
+            </a:r>
+          </a:p>
+        </p:txBody>
+      </p:sp>
+      <p:sp>
+        <p:nvSpPr>
+          <p:cNvPr id="98" name="TextBox 97"/>
+          <p:cNvSpPr txBox="1"/>
+          <p:nvPr/>
+        </p:nvSpPr>
+        <p:spPr>
+          <a:xfrm rot="19200146">
+            <a:off x="9459828" y="2262354"/>
+            <a:ext cx="1702267" cy="261610"/>
+          </a:xfrm>
+          <a:prstGeom prst="rect">
+            <a:avLst/>
+          </a:prstGeom>
+          <a:noFill/>
+        </p:spPr>
+        <p:txBody>
+          <a:bodyPr wrap="square" rtlCol="0">
+            <a:spAutoFit/>
+          </a:bodyPr>
+          <a:lstStyle/>
+          <a:p>
+            <a:r>
+              <a:rPr lang="en-GB" sz="1100"/>
+              <a:t>owner</a:t>
+            </a:r>
+          </a:p>
+        </p:txBody>
+      </p:sp>
+      <p:sp>
+        <p:nvSpPr>
+          <p:cNvPr id="99" name="Rectangular Callout 4"/>
+          <p:cNvSpPr/>
+          <p:nvPr/>
+        </p:nvSpPr>
+        <p:spPr>
+          <a:xfrm>
+            <a:off x="14203372" y="-815084"/>
+            <a:ext cx="1981510" cy="1516161"/>
+          </a:xfrm>
+          <a:prstGeom prst="wedgeRectCallout">
+            <a:avLst>
+              <a:gd name="adj1" fmla="val -156702"/>
+              <a:gd name="adj2" fmla="val 87536"/>
+            </a:avLst>
+          </a:prstGeom>
+        </p:spPr>
+        <p:style>
+          <a:lnRef idx="2">
+            <a:schemeClr val="accent4">
+              <a:shade val="50000"/>
+            </a:schemeClr>
+          </a:lnRef>
+          <a:fillRef idx="1">
+            <a:schemeClr val="accent4"/>
+          </a:fillRef>
+          <a:effectRef idx="0">
+            <a:schemeClr val="accent4"/>
+          </a:effectRef>
+          <a:fontRef idx="minor">
+            <a:schemeClr val="lt1"/>
+          </a:fontRef>
+        </p:style>
+        <p:txBody>
+          <a:bodyPr rtlCol="0" anchor="ctr"/>
+          <a:lstStyle/>
+          <a:p>
+            <a:pPr algn="ctr"/>
+            <a:r>
+              <a:rPr lang="en-GB"/>
+              <a:t>Therefore everyone is participant – is that a good way to model?</a:t>
+            </a:r>
+          </a:p>
+        </p:txBody>
+      </p:sp>
+      <p:sp>
+        <p:nvSpPr>
+          <p:cNvPr id="100" name="TextBox 99"/>
+          <p:cNvSpPr txBox="1"/>
+          <p:nvPr/>
+        </p:nvSpPr>
+        <p:spPr>
+          <a:xfrm>
+            <a:off x="10714855" y="1145517"/>
+            <a:ext cx="603106" cy="369332"/>
+          </a:xfrm>
+          <a:prstGeom prst="rect">
+            <a:avLst/>
+          </a:prstGeom>
+          <a:noFill/>
+        </p:spPr>
+        <p:txBody>
+          <a:bodyPr wrap="square" rtlCol="0">
+            <a:spAutoFit/>
+          </a:bodyPr>
+          <a:lstStyle/>
+          <a:p>
+            <a:r>
+              <a:rPr lang="en-GB"/>
+              <a:t>0..*</a:t>
+            </a:r>
+          </a:p>
+        </p:txBody>
+      </p:sp>
+      <p:sp>
+        <p:nvSpPr>
+          <p:cNvPr id="101" name="TextBox 100"/>
+          <p:cNvSpPr txBox="1"/>
+          <p:nvPr/>
+        </p:nvSpPr>
+        <p:spPr>
+          <a:xfrm>
+            <a:off x="9460408" y="2351581"/>
+            <a:ext cx="603106" cy="369332"/>
+          </a:xfrm>
+          <a:prstGeom prst="rect">
+            <a:avLst/>
+          </a:prstGeom>
+          <a:noFill/>
+        </p:spPr>
+        <p:txBody>
+          <a:bodyPr wrap="square" rtlCol="0">
+            <a:spAutoFit/>
+          </a:bodyPr>
+          <a:lstStyle/>
+          <a:p>
+            <a:r>
+              <a:rPr lang="en-GB"/>
+              <a:t>1..*</a:t>
+            </a:r>
+          </a:p>
+        </p:txBody>
+      </p:sp>
+      <p:sp>
+        <p:nvSpPr>
+          <p:cNvPr id="102" name="TextBox 101"/>
+          <p:cNvSpPr txBox="1"/>
+          <p:nvPr/>
+        </p:nvSpPr>
+        <p:spPr>
+          <a:xfrm>
+            <a:off x="10707573" y="77737"/>
+            <a:ext cx="603106" cy="369332"/>
+          </a:xfrm>
+          <a:prstGeom prst="rect">
+            <a:avLst/>
+          </a:prstGeom>
+          <a:noFill/>
+        </p:spPr>
+        <p:txBody>
+          <a:bodyPr wrap="square" rtlCol="0">
+            <a:spAutoFit/>
+          </a:bodyPr>
+          <a:lstStyle/>
+          <a:p>
+            <a:r>
+              <a:rPr lang="en-GB"/>
+              <a:t>1..*</a:t>
+            </a:r>
+          </a:p>
+        </p:txBody>
+      </p:sp>
+      <p:sp>
+        <p:nvSpPr>
+          <p:cNvPr id="103" name="TextBox 102"/>
+          <p:cNvSpPr txBox="1"/>
+          <p:nvPr/>
+        </p:nvSpPr>
+        <p:spPr>
+          <a:xfrm>
+            <a:off x="9453126" y="1283801"/>
+            <a:ext cx="603106" cy="369332"/>
+          </a:xfrm>
+          <a:prstGeom prst="rect">
+            <a:avLst/>
+          </a:prstGeom>
+          <a:noFill/>
+        </p:spPr>
+        <p:txBody>
+          <a:bodyPr wrap="square" rtlCol="0">
+            <a:spAutoFit/>
+          </a:bodyPr>
+          <a:lstStyle/>
+          <a:p>
+            <a:r>
+              <a:rPr lang="en-GB"/>
+              <a:t>0..*</a:t>
+            </a:r>
           </a:p>
         </p:txBody>
       </p:sp>
@@ -13509,7 +14115,7 @@
           <a:lstStyle/>
           <a:p>
             <a:r>
-              <a:rPr lang="en-GB" dirty="0">
+              <a:rPr lang="en-GB">
                 <a:solidFill>
                   <a:schemeClr val="accent1"/>
                 </a:solidFill>
@@ -13556,7 +14162,7 @@
           <a:p>
             <a:pPr algn="ctr"/>
             <a:r>
-              <a:rPr lang="en-GB" dirty="0"/>
+              <a:rPr lang="en-GB"/>
               <a:t>Created</a:t>
             </a:r>
           </a:p>
@@ -13599,7 +14205,7 @@
           <a:p>
             <a:pPr algn="ctr"/>
             <a:r>
-              <a:rPr lang="en-GB" dirty="0"/>
+              <a:rPr lang="en-GB"/>
               <a:t>Killed</a:t>
             </a:r>
           </a:p>
@@ -13642,7 +14248,7 @@
           <a:p>
             <a:pPr algn="ctr"/>
             <a:r>
-              <a:rPr lang="en-GB" dirty="0"/>
+              <a:rPr lang="en-GB"/>
               <a:t>Archived</a:t>
             </a:r>
           </a:p>
@@ -13685,7 +14291,7 @@
           <a:p>
             <a:pPr algn="ctr"/>
             <a:r>
-              <a:rPr lang="en-GB" dirty="0"/>
+              <a:rPr lang="en-GB"/>
               <a:t>Sick</a:t>
             </a:r>
           </a:p>
@@ -13728,7 +14334,7 @@
           <a:p>
             <a:pPr algn="ctr"/>
             <a:r>
-              <a:rPr lang="en-GB" dirty="0"/>
+              <a:rPr lang="en-GB"/>
               <a:t>Dying</a:t>
             </a:r>
           </a:p>
@@ -13996,7 +14602,7 @@
           <a:p>
             <a:pPr algn="ctr"/>
             <a:r>
-              <a:rPr lang="en-GB" dirty="0"/>
+              <a:rPr lang="en-GB"/>
               <a:t>Could it be achieved for any other reason?</a:t>
             </a:r>
           </a:p>
@@ -14100,7 +14706,7 @@
           </a:lstStyle>
           <a:p>
             <a:r>
-              <a:rPr lang="en-GB" i="1" dirty="0">
+              <a:rPr lang="en-GB" i="1">
                 <a:solidFill>
                   <a:schemeClr val="accent1"/>
                 </a:solidFill>
@@ -14133,11 +14739,11 @@
           <a:lstStyle/>
           <a:p>
             <a:r>
-              <a:rPr lang="en-GB" sz="1400" i="1" dirty="0" err="1"/>
+              <a:rPr lang="en-GB" sz="1400" i="1" err="1"/>
               <a:t>healthPoints</a:t>
             </a:r>
             <a:r>
-              <a:rPr lang="en-GB" sz="1400" i="1" dirty="0"/>
+              <a:rPr lang="en-GB" sz="1400" i="1"/>
               <a:t> &lt; ?</a:t>
             </a:r>
           </a:p>
@@ -14166,11 +14772,11 @@
           <a:lstStyle/>
           <a:p>
             <a:r>
-              <a:rPr lang="en-GB" sz="1400" i="1" dirty="0" err="1"/>
+              <a:rPr lang="en-GB" sz="1400" i="1" err="1"/>
               <a:t>healthPoints</a:t>
             </a:r>
             <a:r>
-              <a:rPr lang="en-GB" sz="1400" i="1" dirty="0"/>
+              <a:rPr lang="en-GB" sz="1400" i="1"/>
               <a:t> &lt; ??</a:t>
             </a:r>
           </a:p>
@@ -14199,11 +14805,11 @@
           <a:lstStyle/>
           <a:p>
             <a:r>
-              <a:rPr lang="en-GB" sz="1400" i="1" dirty="0" err="1"/>
+              <a:rPr lang="en-GB" sz="1400" i="1" err="1"/>
               <a:t>healthPoints</a:t>
             </a:r>
             <a:r>
-              <a:rPr lang="en-GB" sz="1400" i="1" dirty="0"/>
+              <a:rPr lang="en-GB" sz="1400" i="1"/>
               <a:t> &lt;= 0</a:t>
             </a:r>
           </a:p>
@@ -14232,7 +14838,7 @@
           <a:lstStyle/>
           <a:p>
             <a:r>
-              <a:rPr lang="en-GB" sz="1400" i="1" dirty="0"/>
+              <a:rPr lang="en-GB" sz="1400" i="1"/>
               <a:t>Ticket connected to thread is marked by  Admin as indecent</a:t>
             </a:r>
           </a:p>
@@ -14375,11 +14981,11 @@
           <a:lstStyle/>
           <a:p>
             <a:r>
-              <a:rPr lang="en-GB" sz="1400" i="1" dirty="0" err="1"/>
+              <a:rPr lang="en-GB" sz="1400" i="1" err="1"/>
               <a:t>healthPoints</a:t>
             </a:r>
             <a:r>
-              <a:rPr lang="en-GB" sz="1400" i="1" dirty="0"/>
+              <a:rPr lang="en-GB" sz="1400" i="1"/>
               <a:t> return to &gt; ??</a:t>
             </a:r>
           </a:p>
@@ -14408,11 +15014,11 @@
           <a:lstStyle/>
           <a:p>
             <a:r>
-              <a:rPr lang="en-GB" sz="1400" i="1" dirty="0" err="1"/>
+              <a:rPr lang="en-GB" sz="1400" i="1" err="1"/>
               <a:t>healthPoints</a:t>
             </a:r>
             <a:r>
-              <a:rPr lang="en-GB" sz="1400" i="1" dirty="0"/>
+              <a:rPr lang="en-GB" sz="1400" i="1"/>
               <a:t> return to &gt; ?</a:t>
             </a:r>
           </a:p>
@@ -14645,7 +15251,7 @@
           <a:lstStyle/>
           <a:p>
             <a:r>
-              <a:rPr lang="en-GB" sz="1400" i="1" dirty="0"/>
+              <a:rPr lang="en-GB" sz="1400" i="1"/>
               <a:t>Retention period ends</a:t>
             </a:r>
           </a:p>
@@ -14709,7 +15315,7 @@
           <a:lstStyle/>
           <a:p>
             <a:r>
-              <a:rPr lang="en-GB" sz="1400" i="1" dirty="0"/>
+              <a:rPr lang="en-GB" sz="1400" i="1"/>
               <a:t>User creates thread</a:t>
             </a:r>
           </a:p>
@@ -14782,7 +15388,7 @@
           <a:p>
             <a:pPr algn="ctr"/>
             <a:r>
-              <a:rPr lang="en-GB" dirty="0"/>
+              <a:rPr lang="en-GB"/>
               <a:t>Reported</a:t>
             </a:r>
           </a:p>
@@ -14825,7 +15431,7 @@
           <a:p>
             <a:pPr algn="ctr"/>
             <a:r>
-              <a:rPr lang="en-GB" dirty="0"/>
+              <a:rPr lang="en-GB"/>
               <a:t>Actioned</a:t>
             </a:r>
           </a:p>
@@ -14868,7 +15474,7 @@
           <a:p>
             <a:pPr algn="ctr"/>
             <a:r>
-              <a:rPr lang="en-GB" dirty="0"/>
+              <a:rPr lang="en-GB"/>
               <a:t>Ignored</a:t>
             </a:r>
           </a:p>
@@ -15092,7 +15698,7 @@
           </a:lstStyle>
           <a:p>
             <a:r>
-              <a:rPr lang="en-GB" dirty="0">
+              <a:rPr lang="en-GB">
                 <a:solidFill>
                   <a:schemeClr val="accent1"/>
                 </a:solidFill>
@@ -15200,7 +15806,7 @@
           </a:lstStyle>
           <a:p>
             <a:r>
-              <a:rPr lang="en-GB" i="1" dirty="0">
+              <a:rPr lang="en-GB" i="1">
                 <a:solidFill>
                   <a:schemeClr val="accent1"/>
                 </a:solidFill>
@@ -15269,7 +15875,7 @@
           <a:lstStyle/>
           <a:p>
             <a:r>
-              <a:rPr lang="en-GB" sz="1400" i="1" dirty="0"/>
+              <a:rPr lang="en-GB" sz="1400" i="1"/>
               <a:t>User reports thread/message as indecent</a:t>
             </a:r>
           </a:p>
@@ -15298,15 +15904,15 @@
           <a:lstStyle/>
           <a:p>
             <a:r>
-              <a:rPr lang="en-GB" sz="1400" i="1" dirty="0"/>
+              <a:rPr lang="en-GB" sz="1400" i="1"/>
               <a:t>Admin marks thread/message as </a:t>
             </a:r>
             <a:r>
-              <a:rPr lang="en-GB" sz="1400" i="1" u="sng" dirty="0"/>
+              <a:rPr lang="en-GB" sz="1400" i="1" u="sng"/>
               <a:t>not</a:t>
             </a:r>
             <a:r>
-              <a:rPr lang="en-GB" sz="1400" i="1" dirty="0"/>
+              <a:rPr lang="en-GB" sz="1400" i="1"/>
               <a:t> indecent</a:t>
             </a:r>
           </a:p>
@@ -15335,7 +15941,7 @@
           <a:lstStyle/>
           <a:p>
             <a:r>
-              <a:rPr lang="en-GB" sz="1400" i="1" dirty="0"/>
+              <a:rPr lang="en-GB" sz="1400" i="1"/>
               <a:t>Admin marks thread/message as indecent</a:t>
             </a:r>
           </a:p>
@@ -15522,7 +16128,7 @@
           <a:lstStyle/>
           <a:p>
             <a:r>
-              <a:rPr lang="en-GB" sz="1400" i="1" dirty="0"/>
+              <a:rPr lang="en-GB" sz="1400" i="1"/>
               <a:t>Retention period ends</a:t>
             </a:r>
           </a:p>
@@ -15551,7 +16157,7 @@
           <a:lstStyle/>
           <a:p>
             <a:r>
-              <a:rPr lang="en-GB" sz="1400" i="1" dirty="0"/>
+              <a:rPr lang="en-GB" sz="1400" i="1"/>
               <a:t>Retention period ends</a:t>
             </a:r>
           </a:p>

</xml_diff>